<commit_message>
working on data calibration and presentation
</commit_message>
<xml_diff>
--- a/Presentation Materials/Калибриране на MEMS Акселерометри.pptx
+++ b/Presentation Materials/Калибриране на MEMS Акселерометри.pptx
@@ -5,7 +5,7 @@
     <p:sldMasterId id="2147483648" r:id="rId1"/>
   </p:sldMasterIdLst>
   <p:notesMasterIdLst>
-    <p:notesMasterId r:id="rId12"/>
+    <p:notesMasterId r:id="rId13"/>
   </p:notesMasterIdLst>
   <p:sldIdLst>
     <p:sldId id="256" r:id="rId2"/>
@@ -16,8 +16,9 @@
     <p:sldId id="264" r:id="rId7"/>
     <p:sldId id="265" r:id="rId8"/>
     <p:sldId id="260" r:id="rId9"/>
-    <p:sldId id="261" r:id="rId10"/>
-    <p:sldId id="262" r:id="rId11"/>
+    <p:sldId id="262" r:id="rId10"/>
+    <p:sldId id="266" r:id="rId11"/>
+    <p:sldId id="261" r:id="rId12"/>
   </p:sldIdLst>
   <p:sldSz cx="12192000" cy="6858000"/>
   <p:notesSz cx="6858000" cy="9144000"/>
@@ -517,6 +518,26 @@
           <a:bodyPr/>
           <a:lstStyle/>
           <a:p>
+            <a:r>
+              <a:rPr lang="bg-BG" dirty="0"/>
+              <a:t>Здравейте Колеги, днес ще ви представа работата ми по проекта за калибриране на </a:t>
+            </a:r>
+            <a:r>
+              <a:rPr lang="en-US" dirty="0"/>
+              <a:t>MEMS</a:t>
+            </a:r>
+            <a:r>
+              <a:rPr lang="bg-BG" dirty="0"/>
+              <a:t> </a:t>
+            </a:r>
+            <a:r>
+              <a:rPr lang="bg-BG" dirty="0" err="1"/>
+              <a:t>акселерометри</a:t>
+            </a:r>
+            <a:r>
+              <a:rPr lang="bg-BG" dirty="0"/>
+              <a:t>.</a:t>
+            </a:r>
             <a:endParaRPr lang="en-US" dirty="0"/>
           </a:p>
         </p:txBody>
@@ -538,7 +559,7 @@
           <a:p>
             <a:fld id="{BDBC6066-D6A3-4C80-8781-30F360945BB1}" type="slidenum">
               <a:rPr lang="en-US" smtClean="0"/>
-              <a:t>3</a:t>
+              <a:t>1</a:t>
             </a:fld>
             <a:endParaRPr lang="en-US"/>
           </a:p>
@@ -547,7 +568,7 @@
     </p:spTree>
     <p:extLst>
       <p:ext uri="{BB962C8B-B14F-4D97-AF65-F5344CB8AC3E}">
-        <p14:creationId xmlns:p14="http://schemas.microsoft.com/office/powerpoint/2010/main" val="3839778109"/>
+        <p14:creationId xmlns:p14="http://schemas.microsoft.com/office/powerpoint/2010/main" val="3731833778"/>
       </p:ext>
     </p:extLst>
   </p:cSld>
@@ -601,6 +622,10 @@
           <a:bodyPr/>
           <a:lstStyle/>
           <a:p>
+            <a:r>
+              <a:rPr lang="bg-BG" dirty="0"/>
+              <a:t>Нещата които ще покрия в тази лекция за &lt;изреждане на точките&gt;</a:t>
+            </a:r>
             <a:endParaRPr lang="en-US" dirty="0"/>
           </a:p>
         </p:txBody>
@@ -622,7 +647,7 @@
           <a:p>
             <a:fld id="{BDBC6066-D6A3-4C80-8781-30F360945BB1}" type="slidenum">
               <a:rPr lang="en-US" smtClean="0"/>
-              <a:t>4</a:t>
+              <a:t>2</a:t>
             </a:fld>
             <a:endParaRPr lang="en-US"/>
           </a:p>
@@ -631,7 +656,7 @@
     </p:spTree>
     <p:extLst>
       <p:ext uri="{BB962C8B-B14F-4D97-AF65-F5344CB8AC3E}">
-        <p14:creationId xmlns:p14="http://schemas.microsoft.com/office/powerpoint/2010/main" val="3632492539"/>
+        <p14:creationId xmlns:p14="http://schemas.microsoft.com/office/powerpoint/2010/main" val="1475141894"/>
       </p:ext>
     </p:extLst>
   </p:cSld>
@@ -685,6 +710,312 @@
           <a:bodyPr/>
           <a:lstStyle/>
           <a:p>
+            <a:pPr marL="0" marR="0" lvl="0" indent="0" algn="l" defTabSz="914400" rtl="0" eaLnBrk="1" fontAlgn="auto" latinLnBrk="0" hangingPunct="1">
+              <a:lnSpc>
+                <a:spcPct val="100000"/>
+              </a:lnSpc>
+              <a:spcBef>
+                <a:spcPts val="0"/>
+              </a:spcBef>
+              <a:spcAft>
+                <a:spcPts val="0"/>
+              </a:spcAft>
+              <a:buClrTx/>
+              <a:buSzTx/>
+              <a:buFontTx/>
+              <a:buNone/>
+              <a:tabLst/>
+              <a:defRPr/>
+            </a:pPr>
+            <a:r>
+              <a:rPr lang="bg-BG" sz="1200" b="0" i="0" kern="1200" dirty="0">
+                <a:solidFill>
+                  <a:schemeClr val="tx1"/>
+                </a:solidFill>
+                <a:effectLst/>
+                <a:latin typeface="+mn-lt"/>
+                <a:ea typeface="+mn-ea"/>
+                <a:cs typeface="+mn-cs"/>
+              </a:rPr>
+              <a:t>Ще започна с кратко представяне на различните </a:t>
+            </a:r>
+            <a:r>
+              <a:rPr lang="bg-BG" sz="1200" b="0" i="0" kern="1200" dirty="0" err="1">
+                <a:solidFill>
+                  <a:schemeClr val="tx1"/>
+                </a:solidFill>
+                <a:effectLst/>
+                <a:latin typeface="+mn-lt"/>
+                <a:ea typeface="+mn-ea"/>
+                <a:cs typeface="+mn-cs"/>
+              </a:rPr>
+              <a:t>акселерометри</a:t>
+            </a:r>
+            <a:r>
+              <a:rPr lang="bg-BG" sz="1200" b="0" i="0" kern="1200" dirty="0">
+                <a:solidFill>
+                  <a:schemeClr val="tx1"/>
+                </a:solidFill>
+                <a:effectLst/>
+                <a:latin typeface="+mn-lt"/>
+                <a:ea typeface="+mn-ea"/>
+                <a:cs typeface="+mn-cs"/>
+              </a:rPr>
+              <a:t>. </a:t>
+            </a:r>
+            <a:r>
+              <a:rPr lang="bg-BG" sz="1200" b="0" i="0" kern="1200" dirty="0" err="1">
+                <a:solidFill>
+                  <a:schemeClr val="tx1"/>
+                </a:solidFill>
+                <a:effectLst/>
+                <a:latin typeface="+mn-lt"/>
+                <a:ea typeface="+mn-ea"/>
+                <a:cs typeface="+mn-cs"/>
+              </a:rPr>
+              <a:t>Акселерометрите</a:t>
+            </a:r>
+            <a:r>
+              <a:rPr lang="bg-BG" sz="1200" b="0" i="0" kern="1200" dirty="0">
+                <a:solidFill>
+                  <a:schemeClr val="tx1"/>
+                </a:solidFill>
+                <a:effectLst/>
+                <a:latin typeface="+mn-lt"/>
+                <a:ea typeface="+mn-ea"/>
+                <a:cs typeface="+mn-cs"/>
+              </a:rPr>
+              <a:t> са уреди за измерване на ускорение и  има различни начини по които работят.</a:t>
+            </a:r>
+          </a:p>
+          <a:p>
+            <a:pPr marL="0" marR="0" lvl="0" indent="0" algn="l" defTabSz="914400" rtl="0" eaLnBrk="1" fontAlgn="auto" latinLnBrk="0" hangingPunct="1">
+              <a:lnSpc>
+                <a:spcPct val="100000"/>
+              </a:lnSpc>
+              <a:spcBef>
+                <a:spcPts val="0"/>
+              </a:spcBef>
+              <a:spcAft>
+                <a:spcPts val="0"/>
+              </a:spcAft>
+              <a:buClrTx/>
+              <a:buSzTx/>
+              <a:buFontTx/>
+              <a:buNone/>
+              <a:tabLst/>
+              <a:defRPr/>
+            </a:pPr>
+            <a:r>
+              <a:rPr lang="en-US" sz="1200" b="0" i="0" kern="1200" dirty="0">
+                <a:solidFill>
+                  <a:schemeClr val="tx1"/>
+                </a:solidFill>
+                <a:effectLst/>
+                <a:latin typeface="+mn-lt"/>
+                <a:ea typeface="+mn-ea"/>
+                <a:cs typeface="+mn-cs"/>
+              </a:rPr>
+              <a:t>The most common accelerometer types: (a) piezoelectric; (b) piezoresistive; and (c) capacitive accelerometers.</a:t>
+            </a:r>
+          </a:p>
+          <a:p>
+            <a:endParaRPr lang="en-US" dirty="0"/>
+          </a:p>
+        </p:txBody>
+      </p:sp>
+      <p:sp>
+        <p:nvSpPr>
+          <p:cNvPr id="4" name="Slide Number Placeholder 3"/>
+          <p:cNvSpPr>
+            <a:spLocks noGrp="1"/>
+          </p:cNvSpPr>
+          <p:nvPr>
+            <p:ph type="sldNum" sz="quarter" idx="5"/>
+          </p:nvPr>
+        </p:nvSpPr>
+        <p:spPr/>
+        <p:txBody>
+          <a:bodyPr/>
+          <a:lstStyle/>
+          <a:p>
+            <a:fld id="{BDBC6066-D6A3-4C80-8781-30F360945BB1}" type="slidenum">
+              <a:rPr lang="en-US" smtClean="0"/>
+              <a:t>3</a:t>
+            </a:fld>
+            <a:endParaRPr lang="en-US"/>
+          </a:p>
+        </p:txBody>
+      </p:sp>
+    </p:spTree>
+    <p:extLst>
+      <p:ext uri="{BB962C8B-B14F-4D97-AF65-F5344CB8AC3E}">
+        <p14:creationId xmlns:p14="http://schemas.microsoft.com/office/powerpoint/2010/main" val="3839778109"/>
+      </p:ext>
+    </p:extLst>
+  </p:cSld>
+  <p:clrMapOvr>
+    <a:masterClrMapping/>
+  </p:clrMapOvr>
+</p:notes>
+</file>
+
+<file path=ppt/notesSlides/notesSlide4.xml><?xml version="1.0" encoding="utf-8"?>
+<p:notes xmlns:a="http://schemas.openxmlformats.org/drawingml/2006/main" xmlns:r="http://schemas.openxmlformats.org/officeDocument/2006/relationships" xmlns:p="http://schemas.openxmlformats.org/presentationml/2006/main">
+  <p:cSld>
+    <p:spTree>
+      <p:nvGrpSpPr>
+        <p:cNvPr id="1" name=""/>
+        <p:cNvGrpSpPr/>
+        <p:nvPr/>
+      </p:nvGrpSpPr>
+      <p:grpSpPr>
+        <a:xfrm>
+          <a:off x="0" y="0"/>
+          <a:ext cx="0" cy="0"/>
+          <a:chOff x="0" y="0"/>
+          <a:chExt cx="0" cy="0"/>
+        </a:xfrm>
+      </p:grpSpPr>
+      <p:sp>
+        <p:nvSpPr>
+          <p:cNvPr id="2" name="Slide Image Placeholder 1"/>
+          <p:cNvSpPr>
+            <a:spLocks noGrp="1" noRot="1" noChangeAspect="1"/>
+          </p:cNvSpPr>
+          <p:nvPr>
+            <p:ph type="sldImg"/>
+          </p:nvPr>
+        </p:nvSpPr>
+        <p:spPr/>
+      </p:sp>
+      <p:sp>
+        <p:nvSpPr>
+          <p:cNvPr id="3" name="Notes Placeholder 2"/>
+          <p:cNvSpPr>
+            <a:spLocks noGrp="1"/>
+          </p:cNvSpPr>
+          <p:nvPr>
+            <p:ph type="body" idx="1"/>
+          </p:nvPr>
+        </p:nvSpPr>
+        <p:spPr/>
+        <p:txBody>
+          <a:bodyPr/>
+          <a:lstStyle/>
+          <a:p>
+            <a:r>
+              <a:rPr lang="bg-BG" dirty="0"/>
+              <a:t>Картинката в ляво показва хоби </a:t>
+            </a:r>
+            <a:r>
+              <a:rPr lang="bg-BG" dirty="0" err="1"/>
+              <a:t>акселерометър</a:t>
+            </a:r>
+            <a:r>
+              <a:rPr lang="bg-BG" dirty="0"/>
+              <a:t>. А вдясно се показва още един начин по който работят този вид сензори.</a:t>
+            </a:r>
+            <a:endParaRPr lang="en-US" dirty="0"/>
+          </a:p>
+        </p:txBody>
+      </p:sp>
+      <p:sp>
+        <p:nvSpPr>
+          <p:cNvPr id="4" name="Slide Number Placeholder 3"/>
+          <p:cNvSpPr>
+            <a:spLocks noGrp="1"/>
+          </p:cNvSpPr>
+          <p:nvPr>
+            <p:ph type="sldNum" sz="quarter" idx="5"/>
+          </p:nvPr>
+        </p:nvSpPr>
+        <p:spPr/>
+        <p:txBody>
+          <a:bodyPr/>
+          <a:lstStyle/>
+          <a:p>
+            <a:fld id="{BDBC6066-D6A3-4C80-8781-30F360945BB1}" type="slidenum">
+              <a:rPr lang="en-US" smtClean="0"/>
+              <a:t>4</a:t>
+            </a:fld>
+            <a:endParaRPr lang="en-US"/>
+          </a:p>
+        </p:txBody>
+      </p:sp>
+    </p:spTree>
+    <p:extLst>
+      <p:ext uri="{BB962C8B-B14F-4D97-AF65-F5344CB8AC3E}">
+        <p14:creationId xmlns:p14="http://schemas.microsoft.com/office/powerpoint/2010/main" val="3632492539"/>
+      </p:ext>
+    </p:extLst>
+  </p:cSld>
+  <p:clrMapOvr>
+    <a:masterClrMapping/>
+  </p:clrMapOvr>
+</p:notes>
+</file>
+
+<file path=ppt/notesSlides/notesSlide5.xml><?xml version="1.0" encoding="utf-8"?>
+<p:notes xmlns:a="http://schemas.openxmlformats.org/drawingml/2006/main" xmlns:r="http://schemas.openxmlformats.org/officeDocument/2006/relationships" xmlns:p="http://schemas.openxmlformats.org/presentationml/2006/main">
+  <p:cSld>
+    <p:spTree>
+      <p:nvGrpSpPr>
+        <p:cNvPr id="1" name=""/>
+        <p:cNvGrpSpPr/>
+        <p:nvPr/>
+      </p:nvGrpSpPr>
+      <p:grpSpPr>
+        <a:xfrm>
+          <a:off x="0" y="0"/>
+          <a:ext cx="0" cy="0"/>
+          <a:chOff x="0" y="0"/>
+          <a:chExt cx="0" cy="0"/>
+        </a:xfrm>
+      </p:grpSpPr>
+      <p:sp>
+        <p:nvSpPr>
+          <p:cNvPr id="2" name="Slide Image Placeholder 1"/>
+          <p:cNvSpPr>
+            <a:spLocks noGrp="1" noRot="1" noChangeAspect="1"/>
+          </p:cNvSpPr>
+          <p:nvPr>
+            <p:ph type="sldImg"/>
+          </p:nvPr>
+        </p:nvSpPr>
+        <p:spPr/>
+      </p:sp>
+      <p:sp>
+        <p:nvSpPr>
+          <p:cNvPr id="3" name="Notes Placeholder 2"/>
+          <p:cNvSpPr>
+            <a:spLocks noGrp="1"/>
+          </p:cNvSpPr>
+          <p:nvPr>
+            <p:ph type="body" idx="1"/>
+          </p:nvPr>
+        </p:nvSpPr>
+        <p:spPr/>
+        <p:txBody>
+          <a:bodyPr/>
+          <a:lstStyle/>
+          <a:p>
+            <a:r>
+              <a:rPr lang="bg-BG" dirty="0" err="1"/>
+              <a:t>Акселерометрите</a:t>
+            </a:r>
+            <a:r>
+              <a:rPr lang="bg-BG" dirty="0"/>
+              <a:t> имат различни видове грешки, &lt;изреди ги&gt;. За този проект разглеждам грешките които идват от Фабричните грешки, както и грешките които се появяват по време на  </a:t>
+            </a:r>
+            <a:r>
+              <a:rPr lang="bg-BG" dirty="0" err="1"/>
+              <a:t>калибрация</a:t>
+            </a:r>
+            <a:r>
+              <a:rPr lang="bg-BG" dirty="0"/>
+              <a:t>.</a:t>
+            </a:r>
             <a:endParaRPr lang="en-US" dirty="0"/>
           </a:p>
         </p:txBody>
@@ -716,6 +1047,526 @@
     <p:extLst>
       <p:ext uri="{BB962C8B-B14F-4D97-AF65-F5344CB8AC3E}">
         <p14:creationId xmlns:p14="http://schemas.microsoft.com/office/powerpoint/2010/main" val="324868589"/>
+      </p:ext>
+    </p:extLst>
+  </p:cSld>
+  <p:clrMapOvr>
+    <a:masterClrMapping/>
+  </p:clrMapOvr>
+</p:notes>
+</file>
+
+<file path=ppt/notesSlides/notesSlide6.xml><?xml version="1.0" encoding="utf-8"?>
+<p:notes xmlns:a="http://schemas.openxmlformats.org/drawingml/2006/main" xmlns:r="http://schemas.openxmlformats.org/officeDocument/2006/relationships" xmlns:p="http://schemas.openxmlformats.org/presentationml/2006/main">
+  <p:cSld>
+    <p:spTree>
+      <p:nvGrpSpPr>
+        <p:cNvPr id="1" name=""/>
+        <p:cNvGrpSpPr/>
+        <p:nvPr/>
+      </p:nvGrpSpPr>
+      <p:grpSpPr>
+        <a:xfrm>
+          <a:off x="0" y="0"/>
+          <a:ext cx="0" cy="0"/>
+          <a:chOff x="0" y="0"/>
+          <a:chExt cx="0" cy="0"/>
+        </a:xfrm>
+      </p:grpSpPr>
+      <p:sp>
+        <p:nvSpPr>
+          <p:cNvPr id="2" name="Slide Image Placeholder 1"/>
+          <p:cNvSpPr>
+            <a:spLocks noGrp="1" noRot="1" noChangeAspect="1"/>
+          </p:cNvSpPr>
+          <p:nvPr>
+            <p:ph type="sldImg"/>
+          </p:nvPr>
+        </p:nvSpPr>
+        <p:spPr/>
+      </p:sp>
+      <p:sp>
+        <p:nvSpPr>
+          <p:cNvPr id="3" name="Notes Placeholder 2"/>
+          <p:cNvSpPr>
+            <a:spLocks noGrp="1"/>
+          </p:cNvSpPr>
+          <p:nvPr>
+            <p:ph type="body" idx="1"/>
+          </p:nvPr>
+        </p:nvSpPr>
+        <p:spPr/>
+        <p:txBody>
+          <a:bodyPr/>
+          <a:lstStyle/>
+          <a:p>
+            <a:r>
+              <a:rPr lang="bg-BG" dirty="0"/>
+              <a:t>Данните от калибрирания сензор в спокойно положение трябва да са (0,0,9.8) или нормата от трите компонента да </a:t>
+            </a:r>
+            <a:r>
+              <a:rPr lang="bg-BG"/>
+              <a:t>е приб9.8</a:t>
+            </a:r>
+            <a:r>
+              <a:rPr lang="bg-BG" dirty="0"/>
+              <a:t>. За да може да постигнем това </a:t>
+            </a:r>
+            <a:endParaRPr lang="en-US" dirty="0"/>
+          </a:p>
+        </p:txBody>
+      </p:sp>
+      <p:sp>
+        <p:nvSpPr>
+          <p:cNvPr id="4" name="Slide Number Placeholder 3"/>
+          <p:cNvSpPr>
+            <a:spLocks noGrp="1"/>
+          </p:cNvSpPr>
+          <p:nvPr>
+            <p:ph type="sldNum" sz="quarter" idx="5"/>
+          </p:nvPr>
+        </p:nvSpPr>
+        <p:spPr/>
+        <p:txBody>
+          <a:bodyPr/>
+          <a:lstStyle/>
+          <a:p>
+            <a:fld id="{BDBC6066-D6A3-4C80-8781-30F360945BB1}" type="slidenum">
+              <a:rPr lang="en-US" smtClean="0"/>
+              <a:t>6</a:t>
+            </a:fld>
+            <a:endParaRPr lang="en-US"/>
+          </a:p>
+        </p:txBody>
+      </p:sp>
+    </p:spTree>
+    <p:extLst>
+      <p:ext uri="{BB962C8B-B14F-4D97-AF65-F5344CB8AC3E}">
+        <p14:creationId xmlns:p14="http://schemas.microsoft.com/office/powerpoint/2010/main" val="3261104617"/>
+      </p:ext>
+    </p:extLst>
+  </p:cSld>
+  <p:clrMapOvr>
+    <a:masterClrMapping/>
+  </p:clrMapOvr>
+</p:notes>
+</file>
+
+<file path=ppt/notesSlides/notesSlide7.xml><?xml version="1.0" encoding="utf-8"?>
+<p:notes xmlns:a="http://schemas.openxmlformats.org/drawingml/2006/main" xmlns:r="http://schemas.openxmlformats.org/officeDocument/2006/relationships" xmlns:p="http://schemas.openxmlformats.org/presentationml/2006/main">
+  <p:cSld>
+    <p:spTree>
+      <p:nvGrpSpPr>
+        <p:cNvPr id="1" name=""/>
+        <p:cNvGrpSpPr/>
+        <p:nvPr/>
+      </p:nvGrpSpPr>
+      <p:grpSpPr>
+        <a:xfrm>
+          <a:off x="0" y="0"/>
+          <a:ext cx="0" cy="0"/>
+          <a:chOff x="0" y="0"/>
+          <a:chExt cx="0" cy="0"/>
+        </a:xfrm>
+      </p:grpSpPr>
+      <p:sp>
+        <p:nvSpPr>
+          <p:cNvPr id="2" name="Slide Image Placeholder 1"/>
+          <p:cNvSpPr>
+            <a:spLocks noGrp="1" noRot="1" noChangeAspect="1"/>
+          </p:cNvSpPr>
+          <p:nvPr>
+            <p:ph type="sldImg"/>
+          </p:nvPr>
+        </p:nvSpPr>
+        <p:spPr/>
+      </p:sp>
+      <p:sp>
+        <p:nvSpPr>
+          <p:cNvPr id="3" name="Notes Placeholder 2"/>
+          <p:cNvSpPr>
+            <a:spLocks noGrp="1"/>
+          </p:cNvSpPr>
+          <p:nvPr>
+            <p:ph type="body" idx="1"/>
+          </p:nvPr>
+        </p:nvSpPr>
+        <p:spPr/>
+        <p:txBody>
+          <a:bodyPr/>
+          <a:lstStyle/>
+          <a:p>
+            <a:r>
+              <a:rPr lang="bg-BG" dirty="0"/>
+              <a:t>За да може да получим калибрирани данни , трябва да направим следните изчисления. В уравнението вектора без шапките са калибрираните а тези с за суровите данни Матрицата М се грижи за </a:t>
+            </a:r>
+            <a:r>
+              <a:rPr lang="bg-BG" dirty="0" err="1"/>
+              <a:t>ортогоналността</a:t>
+            </a:r>
+            <a:r>
+              <a:rPr lang="bg-BG" dirty="0"/>
+              <a:t> на осите </a:t>
+            </a:r>
+            <a:r>
+              <a:rPr lang="en-US" dirty="0"/>
+              <a:t>XYZ</a:t>
+            </a:r>
+            <a:r>
+              <a:rPr lang="bg-BG" dirty="0"/>
+              <a:t>,  и за мащаба, а вектора </a:t>
+            </a:r>
+            <a:r>
+              <a:rPr lang="en-US" dirty="0"/>
+              <a:t>B</a:t>
+            </a:r>
+            <a:r>
+              <a:rPr lang="bg-BG" dirty="0"/>
+              <a:t> се грижи да офсета. Казваме, че данните са калибрирани когато </a:t>
+            </a:r>
+            <a:r>
+              <a:rPr lang="en-US" dirty="0"/>
+              <a:t> </a:t>
+            </a:r>
+            <a:r>
+              <a:rPr lang="bg-BG" sz="1200" dirty="0">
+                <a:solidFill>
+                  <a:schemeClr val="tx1">
+                    <a:lumMod val="65000"/>
+                    <a:lumOff val="35000"/>
+                  </a:schemeClr>
+                </a:solidFill>
+                <a:latin typeface="Montserrat" panose="00000500000000000000" pitchFamily="2" charset="0"/>
+              </a:rPr>
+              <a:t>нормата на вектора на ускорението</a:t>
+            </a:r>
+            <a:r>
+              <a:rPr lang="en-US" sz="1200" dirty="0">
+                <a:solidFill>
+                  <a:schemeClr val="tx1">
+                    <a:lumMod val="65000"/>
+                    <a:lumOff val="35000"/>
+                  </a:schemeClr>
+                </a:solidFill>
+                <a:latin typeface="Montserrat" panose="00000500000000000000" pitchFamily="2" charset="0"/>
+              </a:rPr>
+              <a:t> e </a:t>
+            </a:r>
+            <a:r>
+              <a:rPr lang="bg-BG" sz="1200" dirty="0">
+                <a:solidFill>
+                  <a:schemeClr val="tx1">
+                    <a:lumMod val="65000"/>
+                    <a:lumOff val="35000"/>
+                  </a:schemeClr>
+                </a:solidFill>
+                <a:latin typeface="Montserrat" panose="00000500000000000000" pitchFamily="2" charset="0"/>
+              </a:rPr>
+              <a:t>минус в </a:t>
+            </a:r>
+            <a:r>
+              <a:rPr lang="en-US" sz="1200" dirty="0">
+                <a:solidFill>
+                  <a:schemeClr val="tx1">
+                    <a:lumMod val="65000"/>
+                    <a:lumOff val="35000"/>
+                  </a:schemeClr>
+                </a:solidFill>
+                <a:latin typeface="Montserrat" panose="00000500000000000000" pitchFamily="2" charset="0"/>
+              </a:rPr>
+              <a:t>g </a:t>
+            </a:r>
+            <a:r>
+              <a:rPr lang="bg-BG" sz="1200" dirty="0">
+                <a:solidFill>
+                  <a:schemeClr val="tx1">
+                    <a:lumMod val="65000"/>
+                    <a:lumOff val="35000"/>
+                  </a:schemeClr>
+                </a:solidFill>
+                <a:latin typeface="Montserrat" panose="00000500000000000000" pitchFamily="2" charset="0"/>
+              </a:rPr>
+              <a:t>е приблизително 0. Казвам приблизително, защото заради различни фактор като грешки при изчисление, грешки при измерването както и други външни фактори не е реалистично да очакваме точни резултати.</a:t>
+            </a:r>
+          </a:p>
+          <a:p>
+            <a:r>
+              <a:rPr lang="bg-BG" sz="1200" dirty="0">
+                <a:solidFill>
+                  <a:schemeClr val="tx1">
+                    <a:lumMod val="65000"/>
+                    <a:lumOff val="35000"/>
+                  </a:schemeClr>
+                </a:solidFill>
+                <a:latin typeface="Montserrat" panose="00000500000000000000" pitchFamily="2" charset="0"/>
+              </a:rPr>
+              <a:t>Началото приближение се използва във функцията която минимизира грешката.</a:t>
+            </a:r>
+            <a:endParaRPr lang="en-US" dirty="0"/>
+          </a:p>
+        </p:txBody>
+      </p:sp>
+      <p:sp>
+        <p:nvSpPr>
+          <p:cNvPr id="4" name="Slide Number Placeholder 3"/>
+          <p:cNvSpPr>
+            <a:spLocks noGrp="1"/>
+          </p:cNvSpPr>
+          <p:nvPr>
+            <p:ph type="sldNum" sz="quarter" idx="5"/>
+          </p:nvPr>
+        </p:nvSpPr>
+        <p:spPr/>
+        <p:txBody>
+          <a:bodyPr/>
+          <a:lstStyle/>
+          <a:p>
+            <a:fld id="{BDBC6066-D6A3-4C80-8781-30F360945BB1}" type="slidenum">
+              <a:rPr lang="en-US" smtClean="0"/>
+              <a:t>7</a:t>
+            </a:fld>
+            <a:endParaRPr lang="en-US"/>
+          </a:p>
+        </p:txBody>
+      </p:sp>
+    </p:spTree>
+    <p:extLst>
+      <p:ext uri="{BB962C8B-B14F-4D97-AF65-F5344CB8AC3E}">
+        <p14:creationId xmlns:p14="http://schemas.microsoft.com/office/powerpoint/2010/main" val="1116451402"/>
+      </p:ext>
+    </p:extLst>
+  </p:cSld>
+  <p:clrMapOvr>
+    <a:masterClrMapping/>
+  </p:clrMapOvr>
+</p:notes>
+</file>
+
+<file path=ppt/notesSlides/notesSlide8.xml><?xml version="1.0" encoding="utf-8"?>
+<p:notes xmlns:a="http://schemas.openxmlformats.org/drawingml/2006/main" xmlns:r="http://schemas.openxmlformats.org/officeDocument/2006/relationships" xmlns:p="http://schemas.openxmlformats.org/presentationml/2006/main">
+  <p:cSld>
+    <p:spTree>
+      <p:nvGrpSpPr>
+        <p:cNvPr id="1" name=""/>
+        <p:cNvGrpSpPr/>
+        <p:nvPr/>
+      </p:nvGrpSpPr>
+      <p:grpSpPr>
+        <a:xfrm>
+          <a:off x="0" y="0"/>
+          <a:ext cx="0" cy="0"/>
+          <a:chOff x="0" y="0"/>
+          <a:chExt cx="0" cy="0"/>
+        </a:xfrm>
+      </p:grpSpPr>
+      <p:sp>
+        <p:nvSpPr>
+          <p:cNvPr id="2" name="Slide Image Placeholder 1"/>
+          <p:cNvSpPr>
+            <a:spLocks noGrp="1" noRot="1" noChangeAspect="1"/>
+          </p:cNvSpPr>
+          <p:nvPr>
+            <p:ph type="sldImg"/>
+          </p:nvPr>
+        </p:nvSpPr>
+        <p:spPr/>
+      </p:sp>
+      <p:sp>
+        <p:nvSpPr>
+          <p:cNvPr id="3" name="Notes Placeholder 2"/>
+          <p:cNvSpPr>
+            <a:spLocks noGrp="1"/>
+          </p:cNvSpPr>
+          <p:nvPr>
+            <p:ph type="body" idx="1"/>
+          </p:nvPr>
+        </p:nvSpPr>
+        <p:spPr/>
+        <p:txBody>
+          <a:bodyPr/>
+          <a:lstStyle/>
+          <a:p>
+            <a:r>
+              <a:rPr lang="bg-BG" dirty="0"/>
+              <a:t>За калибриране на данните  използвам метода на най-малките квадрати. Тук се виждат данните преди и след </a:t>
+            </a:r>
+            <a:r>
+              <a:rPr lang="bg-BG" dirty="0" err="1"/>
+              <a:t>калибрация</a:t>
+            </a:r>
+            <a:r>
+              <a:rPr lang="bg-BG" dirty="0"/>
+              <a:t>, както и нормите на тези данни. Ясно се вижда, че преди да се </a:t>
+            </a:r>
+            <a:r>
+              <a:rPr lang="bg-BG" dirty="0" err="1"/>
+              <a:t>калибрирад</a:t>
+            </a:r>
+            <a:r>
+              <a:rPr lang="bg-BG" dirty="0"/>
+              <a:t> данните, нормите са произволни, докато тези след </a:t>
+            </a:r>
+            <a:r>
+              <a:rPr lang="bg-BG" dirty="0" err="1"/>
+              <a:t>калибрацията</a:t>
+            </a:r>
+            <a:r>
+              <a:rPr lang="bg-BG" dirty="0"/>
+              <a:t> са около 9.8, това показва, че </a:t>
+            </a:r>
+            <a:r>
+              <a:rPr lang="bg-BG" dirty="0" err="1"/>
+              <a:t>калибрацията</a:t>
+            </a:r>
+            <a:r>
+              <a:rPr lang="bg-BG" dirty="0"/>
+              <a:t> работи.</a:t>
+            </a:r>
+            <a:endParaRPr lang="en-US" dirty="0"/>
+          </a:p>
+        </p:txBody>
+      </p:sp>
+      <p:sp>
+        <p:nvSpPr>
+          <p:cNvPr id="4" name="Slide Number Placeholder 3"/>
+          <p:cNvSpPr>
+            <a:spLocks noGrp="1"/>
+          </p:cNvSpPr>
+          <p:nvPr>
+            <p:ph type="sldNum" sz="quarter" idx="5"/>
+          </p:nvPr>
+        </p:nvSpPr>
+        <p:spPr/>
+        <p:txBody>
+          <a:bodyPr/>
+          <a:lstStyle/>
+          <a:p>
+            <a:fld id="{BDBC6066-D6A3-4C80-8781-30F360945BB1}" type="slidenum">
+              <a:rPr lang="en-US" smtClean="0"/>
+              <a:t>8</a:t>
+            </a:fld>
+            <a:endParaRPr lang="en-US"/>
+          </a:p>
+        </p:txBody>
+      </p:sp>
+    </p:spTree>
+    <p:extLst>
+      <p:ext uri="{BB962C8B-B14F-4D97-AF65-F5344CB8AC3E}">
+        <p14:creationId xmlns:p14="http://schemas.microsoft.com/office/powerpoint/2010/main" val="3932410987"/>
+      </p:ext>
+    </p:extLst>
+  </p:cSld>
+  <p:clrMapOvr>
+    <a:masterClrMapping/>
+  </p:clrMapOvr>
+</p:notes>
+</file>
+
+<file path=ppt/notesSlides/notesSlide9.xml><?xml version="1.0" encoding="utf-8"?>
+<p:notes xmlns:a="http://schemas.openxmlformats.org/drawingml/2006/main" xmlns:r="http://schemas.openxmlformats.org/officeDocument/2006/relationships" xmlns:p="http://schemas.openxmlformats.org/presentationml/2006/main">
+  <p:cSld>
+    <p:spTree>
+      <p:nvGrpSpPr>
+        <p:cNvPr id="1" name=""/>
+        <p:cNvGrpSpPr/>
+        <p:nvPr/>
+      </p:nvGrpSpPr>
+      <p:grpSpPr>
+        <a:xfrm>
+          <a:off x="0" y="0"/>
+          <a:ext cx="0" cy="0"/>
+          <a:chOff x="0" y="0"/>
+          <a:chExt cx="0" cy="0"/>
+        </a:xfrm>
+      </p:grpSpPr>
+      <p:sp>
+        <p:nvSpPr>
+          <p:cNvPr id="2" name="Slide Image Placeholder 1"/>
+          <p:cNvSpPr>
+            <a:spLocks noGrp="1" noRot="1" noChangeAspect="1"/>
+          </p:cNvSpPr>
+          <p:nvPr>
+            <p:ph type="sldImg"/>
+          </p:nvPr>
+        </p:nvSpPr>
+        <p:spPr/>
+      </p:sp>
+      <p:sp>
+        <p:nvSpPr>
+          <p:cNvPr id="3" name="Notes Placeholder 2"/>
+          <p:cNvSpPr>
+            <a:spLocks noGrp="1"/>
+          </p:cNvSpPr>
+          <p:nvPr>
+            <p:ph type="body" idx="1"/>
+          </p:nvPr>
+        </p:nvSpPr>
+        <p:spPr/>
+        <p:txBody>
+          <a:bodyPr/>
+          <a:lstStyle/>
+          <a:p>
+            <a:r>
+              <a:rPr lang="bg-BG" dirty="0"/>
+              <a:t>Бъдещето развитие на проекта се състои  от създаване на собствена функция за минимизация която да използвам в метода на най-малките  квадрати.</a:t>
+            </a:r>
+          </a:p>
+          <a:p>
+            <a:endParaRPr lang="bg-BG" dirty="0"/>
+          </a:p>
+          <a:p>
+            <a:r>
+              <a:rPr lang="bg-BG" dirty="0"/>
+              <a:t>Искам и да извлече добри данни от моя сензор за да го калибрирам. (Извадил съм едни данни, но те са само в изправено положение, а  трябва да са в няколко различни позиции)</a:t>
+            </a:r>
+          </a:p>
+          <a:p>
+            <a:endParaRPr lang="bg-BG" dirty="0"/>
+          </a:p>
+          <a:p>
+            <a:r>
+              <a:rPr lang="bg-BG" dirty="0"/>
+              <a:t>След като </a:t>
+            </a:r>
+            <a:r>
+              <a:rPr lang="bg-BG" dirty="0" err="1"/>
+              <a:t>калибрацията</a:t>
+            </a:r>
+            <a:r>
+              <a:rPr lang="bg-BG" dirty="0"/>
+              <a:t> е направена искам да използвам сензора в робот за да следя как се движи и да го управлявам.</a:t>
+            </a:r>
+            <a:endParaRPr lang="en-US" dirty="0"/>
+          </a:p>
+        </p:txBody>
+      </p:sp>
+      <p:sp>
+        <p:nvSpPr>
+          <p:cNvPr id="4" name="Slide Number Placeholder 3"/>
+          <p:cNvSpPr>
+            <a:spLocks noGrp="1"/>
+          </p:cNvSpPr>
+          <p:nvPr>
+            <p:ph type="sldNum" sz="quarter" idx="5"/>
+          </p:nvPr>
+        </p:nvSpPr>
+        <p:spPr/>
+        <p:txBody>
+          <a:bodyPr/>
+          <a:lstStyle/>
+          <a:p>
+            <a:fld id="{BDBC6066-D6A3-4C80-8781-30F360945BB1}" type="slidenum">
+              <a:rPr lang="en-US" smtClean="0"/>
+              <a:t>9</a:t>
+            </a:fld>
+            <a:endParaRPr lang="en-US"/>
+          </a:p>
+        </p:txBody>
+      </p:sp>
+    </p:spTree>
+    <p:extLst>
+      <p:ext uri="{BB962C8B-B14F-4D97-AF65-F5344CB8AC3E}">
+        <p14:creationId xmlns:p14="http://schemas.microsoft.com/office/powerpoint/2010/main" val="4182085913"/>
       </p:ext>
     </p:extLst>
   </p:cSld>
@@ -3957,8 +4808,8 @@
         </p:nvSpPr>
         <p:spPr>
           <a:xfrm>
-            <a:off x="1524000" y="2235200"/>
-            <a:ext cx="9144000" cy="2387600"/>
+            <a:off x="1524000" y="2632075"/>
+            <a:ext cx="9144000" cy="1593850"/>
           </a:xfrm>
         </p:spPr>
         <p:txBody>
@@ -3970,47 +4821,35 @@
             <a:r>
               <a:rPr lang="bg-BG" dirty="0">
                 <a:solidFill>
-                  <a:schemeClr val="tx1">
-                    <a:lumMod val="75000"/>
-                    <a:lumOff val="25000"/>
-                  </a:schemeClr>
+                  <a:srgbClr val="FFA161"/>
                 </a:solidFill>
-                <a:latin typeface="Montserrat SemiBold" panose="00000700000000000000" pitchFamily="2" charset="0"/>
+                <a:latin typeface="Montserrat Black" panose="00000A00000000000000" pitchFamily="2" charset="0"/>
               </a:rPr>
               <a:t>Калибриране на </a:t>
             </a:r>
             <a:r>
               <a:rPr lang="en-US" dirty="0">
                 <a:solidFill>
-                  <a:schemeClr val="tx1">
-                    <a:lumMod val="75000"/>
-                    <a:lumOff val="25000"/>
-                  </a:schemeClr>
+                  <a:srgbClr val="FFA161"/>
                 </a:solidFill>
-                <a:latin typeface="Montserrat SemiBold" panose="00000700000000000000" pitchFamily="2" charset="0"/>
+                <a:latin typeface="Montserrat Black" panose="00000A00000000000000" pitchFamily="2" charset="0"/>
               </a:rPr>
               <a:t>MEMS </a:t>
             </a:r>
             <a:r>
               <a:rPr lang="bg-BG" dirty="0" err="1">
                 <a:solidFill>
-                  <a:schemeClr val="tx1">
-                    <a:lumMod val="75000"/>
-                    <a:lumOff val="25000"/>
-                  </a:schemeClr>
+                  <a:srgbClr val="FFA161"/>
                 </a:solidFill>
-                <a:latin typeface="Montserrat SemiBold" panose="00000700000000000000" pitchFamily="2" charset="0"/>
+                <a:latin typeface="Montserrat Black" panose="00000A00000000000000" pitchFamily="2" charset="0"/>
               </a:rPr>
               <a:t>Акселерометри</a:t>
             </a:r>
             <a:endParaRPr lang="en-US" dirty="0">
               <a:solidFill>
-                <a:schemeClr val="tx1">
-                  <a:lumMod val="75000"/>
-                  <a:lumOff val="25000"/>
-                </a:schemeClr>
+                <a:srgbClr val="FFA161"/>
               </a:solidFill>
-              <a:latin typeface="Montserrat SemiBold" panose="00000700000000000000" pitchFamily="2" charset="0"/>
+              <a:latin typeface="Montserrat Black" panose="00000A00000000000000" pitchFamily="2" charset="0"/>
             </a:endParaRPr>
           </a:p>
         </p:txBody>
@@ -4050,7 +4889,84 @@
           <p:cNvPr id="2" name="Title 1">
             <a:extLst>
               <a:ext uri="{FF2B5EF4-FFF2-40B4-BE49-F238E27FC236}">
-                <a16:creationId xmlns:a16="http://schemas.microsoft.com/office/drawing/2014/main" id="{CB27A2B1-E2C3-49A5-8CC4-8404AB9E59E9}"/>
+                <a16:creationId xmlns:a16="http://schemas.microsoft.com/office/drawing/2014/main" id="{86203A77-C0D2-4F5E-A008-CBFFC572B178}"/>
+              </a:ext>
+            </a:extLst>
+          </p:cNvPr>
+          <p:cNvSpPr>
+            <a:spLocks noGrp="1"/>
+          </p:cNvSpPr>
+          <p:nvPr>
+            <p:ph type="title"/>
+          </p:nvPr>
+        </p:nvSpPr>
+        <p:spPr>
+          <a:xfrm>
+            <a:off x="838200" y="2766218"/>
+            <a:ext cx="10515600" cy="1325563"/>
+          </a:xfrm>
+        </p:spPr>
+        <p:txBody>
+          <a:bodyPr>
+            <a:noAutofit/>
+          </a:bodyPr>
+          <a:lstStyle/>
+          <a:p>
+            <a:pPr algn="ctr"/>
+            <a:r>
+              <a:rPr lang="bg-BG" sz="7200" dirty="0">
+                <a:solidFill>
+                  <a:srgbClr val="FFA161"/>
+                </a:solidFill>
+                <a:latin typeface="Montserrat Black" panose="00000A00000000000000" pitchFamily="2" charset="0"/>
+              </a:rPr>
+              <a:t>Благодаря за вниманието!</a:t>
+            </a:r>
+            <a:endParaRPr lang="en-US" sz="7200" dirty="0">
+              <a:solidFill>
+                <a:srgbClr val="FFA161"/>
+              </a:solidFill>
+              <a:latin typeface="Montserrat Black" panose="00000A00000000000000" pitchFamily="2" charset="0"/>
+            </a:endParaRPr>
+          </a:p>
+        </p:txBody>
+      </p:sp>
+    </p:spTree>
+    <p:extLst>
+      <p:ext uri="{BB962C8B-B14F-4D97-AF65-F5344CB8AC3E}">
+        <p14:creationId xmlns:p14="http://schemas.microsoft.com/office/powerpoint/2010/main" val="676770525"/>
+      </p:ext>
+    </p:extLst>
+  </p:cSld>
+  <p:clrMapOvr>
+    <a:masterClrMapping/>
+  </p:clrMapOvr>
+</p:sld>
+</file>
+
+<file path=ppt/slides/slide11.xml><?xml version="1.0" encoding="utf-8"?>
+<p:sld xmlns:a="http://schemas.openxmlformats.org/drawingml/2006/main" xmlns:r="http://schemas.openxmlformats.org/officeDocument/2006/relationships" xmlns:p="http://schemas.openxmlformats.org/presentationml/2006/main" show="0">
+  <p:cSld>
+    <p:spTree>
+      <p:nvGrpSpPr>
+        <p:cNvPr id="1" name=""/>
+        <p:cNvGrpSpPr/>
+        <p:nvPr/>
+      </p:nvGrpSpPr>
+      <p:grpSpPr>
+        <a:xfrm>
+          <a:off x="0" y="0"/>
+          <a:ext cx="0" cy="0"/>
+          <a:chOff x="0" y="0"/>
+          <a:chExt cx="0" cy="0"/>
+        </a:xfrm>
+      </p:grpSpPr>
+      <p:sp>
+        <p:nvSpPr>
+          <p:cNvPr id="2" name="Title 1">
+            <a:extLst>
+              <a:ext uri="{FF2B5EF4-FFF2-40B4-BE49-F238E27FC236}">
+                <a16:creationId xmlns:a16="http://schemas.microsoft.com/office/drawing/2014/main" id="{4BC4D5C1-3090-4B9A-8949-FB47279DCC8D}"/>
               </a:ext>
             </a:extLst>
           </p:cNvPr>
@@ -4072,10 +4988,10 @@
               <a:rPr lang="bg-BG" dirty="0">
                 <a:latin typeface="Montserrat SemiBold" panose="00000700000000000000" pitchFamily="2" charset="0"/>
               </a:rPr>
-              <a:t>Създаване на собствена функция за минимизация</a:t>
+              <a:t>Извличане на данни от собствен сензор</a:t>
             </a:r>
             <a:br>
-              <a:rPr lang="en-US" dirty="0">
+              <a:rPr lang="bg-BG" dirty="0">
                 <a:latin typeface="Montserrat SemiBold" panose="00000700000000000000" pitchFamily="2" charset="0"/>
               </a:rPr>
             </a:br>
@@ -4088,7 +5004,7 @@
           <p:cNvPr id="3" name="Content Placeholder 2">
             <a:extLst>
               <a:ext uri="{FF2B5EF4-FFF2-40B4-BE49-F238E27FC236}">
-                <a16:creationId xmlns:a16="http://schemas.microsoft.com/office/drawing/2014/main" id="{53D9E26B-0A4B-4BF1-A021-04068BC6C3F0}"/>
+                <a16:creationId xmlns:a16="http://schemas.microsoft.com/office/drawing/2014/main" id="{602437FF-726F-4E5A-B55D-B2E3AE838374}"/>
               </a:ext>
             </a:extLst>
           </p:cNvPr>
@@ -4104,14 +5020,43 @@
           <a:bodyPr/>
           <a:lstStyle/>
           <a:p>
-            <a:endParaRPr lang="en-US"/>
+            <a:r>
+              <a:rPr lang="en-US" dirty="0"/>
+              <a:t>Raspberry Pi</a:t>
+            </a:r>
+            <a:endParaRPr lang="bg-BG" dirty="0"/>
+          </a:p>
+          <a:p>
+            <a:pPr marL="0" indent="0">
+              <a:buNone/>
+            </a:pPr>
+            <a:endParaRPr lang="en-US" dirty="0"/>
+          </a:p>
+          <a:p>
+            <a:r>
+              <a:rPr lang="en-US" dirty="0"/>
+              <a:t>Python</a:t>
+            </a:r>
+            <a:endParaRPr lang="bg-BG" dirty="0"/>
+          </a:p>
+          <a:p>
+            <a:pPr marL="0" indent="0">
+              <a:buNone/>
+            </a:pPr>
+            <a:endParaRPr lang="en-US" dirty="0"/>
+          </a:p>
+          <a:p>
+            <a:r>
+              <a:rPr lang="en-US" dirty="0"/>
+              <a:t>Shell script</a:t>
+            </a:r>
           </a:p>
         </p:txBody>
       </p:sp>
     </p:spTree>
     <p:extLst>
       <p:ext uri="{BB962C8B-B14F-4D97-AF65-F5344CB8AC3E}">
-        <p14:creationId xmlns:p14="http://schemas.microsoft.com/office/powerpoint/2010/main" val="3871061468"/>
+        <p14:creationId xmlns:p14="http://schemas.microsoft.com/office/powerpoint/2010/main" val="1868462218"/>
       </p:ext>
     </p:extLst>
   </p:cSld>
@@ -4162,23 +5107,41 @@
         </p:spPr>
         <p:txBody>
           <a:bodyPr>
-            <a:normAutofit fontScale="85000" lnSpcReduction="20000"/>
+            <a:normAutofit lnSpcReduction="10000"/>
           </a:bodyPr>
           <a:lstStyle/>
           <a:p>
             <a:r>
               <a:rPr lang="bg-BG" dirty="0">
+                <a:solidFill>
+                  <a:schemeClr val="tx1">
+                    <a:lumMod val="65000"/>
+                    <a:lumOff val="35000"/>
+                  </a:schemeClr>
+                </a:solidFill>
                 <a:latin typeface="Montserrat SemiBold" panose="00000700000000000000" pitchFamily="2" charset="0"/>
               </a:rPr>
               <a:t>Запознаване със различни </a:t>
             </a:r>
             <a:r>
               <a:rPr lang="bg-BG" dirty="0" err="1">
+                <a:solidFill>
+                  <a:schemeClr val="tx1">
+                    <a:lumMod val="65000"/>
+                    <a:lumOff val="35000"/>
+                  </a:schemeClr>
+                </a:solidFill>
                 <a:latin typeface="Montserrat SemiBold" panose="00000700000000000000" pitchFamily="2" charset="0"/>
               </a:rPr>
               <a:t>Акселерометри</a:t>
             </a:r>
             <a:endParaRPr lang="bg-BG" dirty="0">
+              <a:solidFill>
+                <a:schemeClr val="tx1">
+                  <a:lumMod val="65000"/>
+                  <a:lumOff val="35000"/>
+                </a:schemeClr>
+              </a:solidFill>
               <a:latin typeface="Montserrat SemiBold" panose="00000700000000000000" pitchFamily="2" charset="0"/>
             </a:endParaRPr>
           </a:p>
@@ -4187,29 +5150,59 @@
               <a:buNone/>
             </a:pPr>
             <a:endParaRPr lang="bg-BG" dirty="0">
+              <a:solidFill>
+                <a:schemeClr val="tx1">
+                  <a:lumMod val="65000"/>
+                  <a:lumOff val="35000"/>
+                </a:schemeClr>
+              </a:solidFill>
               <a:latin typeface="Montserrat SemiBold" panose="00000700000000000000" pitchFamily="2" charset="0"/>
             </a:endParaRPr>
           </a:p>
           <a:p>
             <a:r>
               <a:rPr lang="bg-BG" dirty="0">
+                <a:solidFill>
+                  <a:schemeClr val="tx1">
+                    <a:lumMod val="65000"/>
+                    <a:lumOff val="35000"/>
+                  </a:schemeClr>
+                </a:solidFill>
                 <a:latin typeface="Montserrat SemiBold" panose="00000700000000000000" pitchFamily="2" charset="0"/>
               </a:rPr>
               <a:t> </a:t>
             </a:r>
             <a:r>
               <a:rPr lang="en-US" dirty="0">
+                <a:solidFill>
+                  <a:schemeClr val="tx1">
+                    <a:lumMod val="65000"/>
+                    <a:lumOff val="35000"/>
+                  </a:schemeClr>
+                </a:solidFill>
                 <a:latin typeface="Montserrat SemiBold" panose="00000700000000000000" pitchFamily="2" charset="0"/>
               </a:rPr>
               <a:t>MEMS A</a:t>
             </a:r>
             <a:r>
               <a:rPr lang="bg-BG" dirty="0" err="1">
+                <a:solidFill>
+                  <a:schemeClr val="tx1">
+                    <a:lumMod val="65000"/>
+                    <a:lumOff val="35000"/>
+                  </a:schemeClr>
+                </a:solidFill>
                 <a:latin typeface="Montserrat SemiBold" panose="00000700000000000000" pitchFamily="2" charset="0"/>
               </a:rPr>
               <a:t>кселерометри</a:t>
             </a:r>
             <a:endParaRPr lang="bg-BG" dirty="0">
+              <a:solidFill>
+                <a:schemeClr val="tx1">
+                  <a:lumMod val="65000"/>
+                  <a:lumOff val="35000"/>
+                </a:schemeClr>
+              </a:solidFill>
               <a:latin typeface="Montserrat SemiBold" panose="00000700000000000000" pitchFamily="2" charset="0"/>
             </a:endParaRPr>
           </a:p>
@@ -4218,12 +5211,24 @@
               <a:buNone/>
             </a:pPr>
             <a:endParaRPr lang="bg-BG" dirty="0">
+              <a:solidFill>
+                <a:schemeClr val="tx1">
+                  <a:lumMod val="65000"/>
+                  <a:lumOff val="35000"/>
+                </a:schemeClr>
+              </a:solidFill>
               <a:latin typeface="Montserrat SemiBold" panose="00000700000000000000" pitchFamily="2" charset="0"/>
             </a:endParaRPr>
           </a:p>
           <a:p>
             <a:r>
               <a:rPr lang="bg-BG" dirty="0">
+                <a:solidFill>
+                  <a:schemeClr val="tx1">
+                    <a:lumMod val="65000"/>
+                    <a:lumOff val="35000"/>
+                  </a:schemeClr>
+                </a:solidFill>
                 <a:latin typeface="Montserrat SemiBold" panose="00000700000000000000" pitchFamily="2" charset="0"/>
               </a:rPr>
               <a:t>Запознаване с проблема</a:t>
@@ -4234,12 +5239,24 @@
               <a:buNone/>
             </a:pPr>
             <a:endParaRPr lang="bg-BG" dirty="0">
+              <a:solidFill>
+                <a:schemeClr val="tx1">
+                  <a:lumMod val="65000"/>
+                  <a:lumOff val="35000"/>
+                </a:schemeClr>
+              </a:solidFill>
               <a:latin typeface="Montserrat SemiBold" panose="00000700000000000000" pitchFamily="2" charset="0"/>
             </a:endParaRPr>
           </a:p>
           <a:p>
             <a:r>
               <a:rPr lang="bg-BG" dirty="0">
+                <a:solidFill>
+                  <a:schemeClr val="tx1">
+                    <a:lumMod val="65000"/>
+                    <a:lumOff val="35000"/>
+                  </a:schemeClr>
+                </a:solidFill>
                 <a:latin typeface="Montserrat SemiBold" panose="00000700000000000000" pitchFamily="2" charset="0"/>
               </a:rPr>
               <a:t>Първоначално решение </a:t>
@@ -4250,33 +5267,35 @@
               <a:buNone/>
             </a:pPr>
             <a:endParaRPr lang="bg-BG" dirty="0">
+              <a:solidFill>
+                <a:schemeClr val="tx1">
+                  <a:lumMod val="65000"/>
+                  <a:lumOff val="35000"/>
+                </a:schemeClr>
+              </a:solidFill>
               <a:latin typeface="Montserrat SemiBold" panose="00000700000000000000" pitchFamily="2" charset="0"/>
             </a:endParaRPr>
           </a:p>
           <a:p>
             <a:r>
               <a:rPr lang="bg-BG" dirty="0">
-                <a:latin typeface="Montserrat SemiBold" panose="00000700000000000000" pitchFamily="2" charset="0"/>
-              </a:rPr>
-              <a:t>Извличане на данни от собствен сензор</a:t>
-            </a:r>
-          </a:p>
-          <a:p>
-            <a:pPr marL="0" indent="0">
-              <a:buNone/>
-            </a:pPr>
-            <a:endParaRPr lang="bg-BG" dirty="0">
-              <a:latin typeface="Montserrat SemiBold" panose="00000700000000000000" pitchFamily="2" charset="0"/>
-            </a:endParaRPr>
-          </a:p>
-          <a:p>
-            <a:r>
-              <a:rPr lang="bg-BG" dirty="0">
+                <a:solidFill>
+                  <a:schemeClr val="tx1">
+                    <a:lumMod val="65000"/>
+                    <a:lumOff val="35000"/>
+                  </a:schemeClr>
+                </a:solidFill>
                 <a:latin typeface="Montserrat SemiBold" panose="00000700000000000000" pitchFamily="2" charset="0"/>
               </a:rPr>
               <a:t>Създаване на собствена функция за минимизация</a:t>
             </a:r>
             <a:endParaRPr lang="en-US" dirty="0">
+              <a:solidFill>
+                <a:schemeClr val="tx1">
+                  <a:lumMod val="65000"/>
+                  <a:lumOff val="35000"/>
+                </a:schemeClr>
+              </a:solidFill>
               <a:latin typeface="Montserrat SemiBold" panose="00000700000000000000" pitchFamily="2" charset="0"/>
             </a:endParaRPr>
           </a:p>
@@ -4336,23 +5355,37 @@
           <a:lstStyle/>
           <a:p>
             <a:r>
-              <a:rPr lang="bg-BG" dirty="0">
-                <a:latin typeface="Montserrat SemiBold" panose="00000700000000000000" pitchFamily="2" charset="0"/>
+              <a:rPr lang="bg-BG" sz="4900" dirty="0">
+                <a:solidFill>
+                  <a:srgbClr val="FFA161"/>
+                </a:solidFill>
+                <a:latin typeface="Montserrat Black" panose="00000A00000000000000" pitchFamily="2" charset="0"/>
               </a:rPr>
               <a:t>Запознаване със различни </a:t>
             </a:r>
             <a:r>
-              <a:rPr lang="bg-BG" dirty="0" err="1">
-                <a:latin typeface="Montserrat SemiBold" panose="00000700000000000000" pitchFamily="2" charset="0"/>
+              <a:rPr lang="bg-BG" sz="4900" dirty="0" err="1">
+                <a:solidFill>
+                  <a:srgbClr val="FFA161"/>
+                </a:solidFill>
+                <a:latin typeface="Montserrat Black" panose="00000A00000000000000" pitchFamily="2" charset="0"/>
               </a:rPr>
               <a:t>Акселерометри</a:t>
             </a:r>
             <a:br>
               <a:rPr lang="bg-BG" dirty="0">
-                <a:latin typeface="Montserrat SemiBold" panose="00000700000000000000" pitchFamily="2" charset="0"/>
+                <a:solidFill>
+                  <a:srgbClr val="FFA161"/>
+                </a:solidFill>
+                <a:latin typeface="Montserrat Black" panose="00000A00000000000000" pitchFamily="2" charset="0"/>
               </a:rPr>
             </a:br>
-            <a:endParaRPr lang="en-US" dirty="0"/>
+            <a:endParaRPr lang="en-US" dirty="0">
+              <a:solidFill>
+                <a:srgbClr val="FFA161"/>
+              </a:solidFill>
+              <a:latin typeface="Montserrat Black" panose="00000A00000000000000" pitchFamily="2" charset="0"/>
+            </a:endParaRPr>
           </a:p>
         </p:txBody>
       </p:sp>
@@ -4379,44 +5412,76 @@
           </a:bodyPr>
           <a:lstStyle/>
           <a:p>
-            <a:pPr algn="ctr"/>
-            <a:r>
-              <a:rPr lang="bg-BG" sz="4800" dirty="0">
+            <a:r>
+              <a:rPr lang="bg-BG" sz="3600" dirty="0">
+                <a:solidFill>
+                  <a:schemeClr val="tx1">
+                    <a:lumMod val="65000"/>
+                    <a:lumOff val="35000"/>
+                  </a:schemeClr>
+                </a:solidFill>
                 <a:latin typeface="Montserrat" panose="00000500000000000000" pitchFamily="2" charset="0"/>
               </a:rPr>
               <a:t>Механични</a:t>
             </a:r>
-            <a:endParaRPr lang="en-US" sz="4800" dirty="0">
+            <a:endParaRPr lang="en-US" sz="3600" dirty="0">
+              <a:solidFill>
+                <a:schemeClr val="tx1">
+                  <a:lumMod val="65000"/>
+                  <a:lumOff val="35000"/>
+                </a:schemeClr>
+              </a:solidFill>
               <a:latin typeface="Montserrat" panose="00000500000000000000" pitchFamily="2" charset="0"/>
             </a:endParaRPr>
           </a:p>
           <a:p>
-            <a:pPr marL="0" indent="0" algn="ctr">
+            <a:pPr marL="0" indent="0">
               <a:buNone/>
             </a:pPr>
-            <a:endParaRPr lang="bg-BG" sz="4800" dirty="0">
+            <a:endParaRPr lang="bg-BG" sz="3600" dirty="0">
+              <a:solidFill>
+                <a:schemeClr val="tx1">
+                  <a:lumMod val="65000"/>
+                  <a:lumOff val="35000"/>
+                </a:schemeClr>
+              </a:solidFill>
               <a:latin typeface="Montserrat" panose="00000500000000000000" pitchFamily="2" charset="0"/>
             </a:endParaRPr>
           </a:p>
           <a:p>
-            <a:pPr algn="ctr"/>
-            <a:r>
-              <a:rPr lang="en-US" sz="4800" dirty="0">
+            <a:r>
+              <a:rPr lang="en-US" sz="3600" dirty="0">
+                <a:solidFill>
+                  <a:schemeClr val="tx1">
+                    <a:lumMod val="65000"/>
+                    <a:lumOff val="35000"/>
+                  </a:schemeClr>
+                </a:solidFill>
                 <a:latin typeface="Montserrat" panose="00000500000000000000" pitchFamily="2" charset="0"/>
               </a:rPr>
               <a:t>Solid State</a:t>
             </a:r>
           </a:p>
           <a:p>
-            <a:pPr algn="ctr"/>
-            <a:endParaRPr lang="bg-BG" sz="4800" dirty="0">
+            <a:endParaRPr lang="bg-BG" sz="3600" dirty="0">
+              <a:solidFill>
+                <a:schemeClr val="tx1">
+                  <a:lumMod val="65000"/>
+                  <a:lumOff val="35000"/>
+                </a:schemeClr>
+              </a:solidFill>
               <a:latin typeface="Montserrat" panose="00000500000000000000" pitchFamily="2" charset="0"/>
             </a:endParaRPr>
           </a:p>
           <a:p>
-            <a:pPr algn="ctr"/>
-            <a:r>
-              <a:rPr lang="en-US" sz="4800" dirty="0">
+            <a:r>
+              <a:rPr lang="en-US" sz="3600" dirty="0">
+                <a:solidFill>
+                  <a:schemeClr val="tx1">
+                    <a:lumMod val="65000"/>
+                    <a:lumOff val="35000"/>
+                  </a:schemeClr>
+                </a:solidFill>
                 <a:latin typeface="Montserrat" panose="00000500000000000000" pitchFamily="2" charset="0"/>
               </a:rPr>
               <a:t>MEMS </a:t>
@@ -4424,6 +5489,78 @@
           </a:p>
         </p:txBody>
       </p:sp>
+      <p:pic>
+        <p:nvPicPr>
+          <p:cNvPr id="6" name="Picture 5" descr="A close up of a sign&#10;&#10;Description automatically generated">
+            <a:extLst>
+              <a:ext uri="{FF2B5EF4-FFF2-40B4-BE49-F238E27FC236}">
+                <a16:creationId xmlns:a16="http://schemas.microsoft.com/office/drawing/2014/main" id="{BE79E47A-3C8E-441E-A287-4BA8E30C5C9E}"/>
+              </a:ext>
+            </a:extLst>
+          </p:cNvPr>
+          <p:cNvPicPr>
+            <a:picLocks noChangeAspect="1"/>
+          </p:cNvPicPr>
+          <p:nvPr/>
+        </p:nvPicPr>
+        <p:blipFill>
+          <a:blip r:embed="rId3">
+            <a:extLst>
+              <a:ext uri="{28A0092B-C50C-407E-A947-70E740481C1C}">
+                <a14:useLocalDpi xmlns:a14="http://schemas.microsoft.com/office/drawing/2010/main" val="0"/>
+              </a:ext>
+            </a:extLst>
+          </a:blip>
+          <a:stretch>
+            <a:fillRect/>
+          </a:stretch>
+        </p:blipFill>
+        <p:spPr>
+          <a:xfrm>
+            <a:off x="5770004" y="1461226"/>
+            <a:ext cx="5509737" cy="2613887"/>
+          </a:xfrm>
+          <a:prstGeom prst="rect">
+            <a:avLst/>
+          </a:prstGeom>
+        </p:spPr>
+      </p:pic>
+      <p:pic>
+        <p:nvPicPr>
+          <p:cNvPr id="8" name="Picture 7" descr="A close up of a device&#10;&#10;Description automatically generated">
+            <a:extLst>
+              <a:ext uri="{FF2B5EF4-FFF2-40B4-BE49-F238E27FC236}">
+                <a16:creationId xmlns:a16="http://schemas.microsoft.com/office/drawing/2014/main" id="{92783687-E4CE-4600-911B-B4573AF989D2}"/>
+              </a:ext>
+            </a:extLst>
+          </p:cNvPr>
+          <p:cNvPicPr>
+            <a:picLocks noChangeAspect="1"/>
+          </p:cNvPicPr>
+          <p:nvPr/>
+        </p:nvPicPr>
+        <p:blipFill>
+          <a:blip r:embed="rId4">
+            <a:extLst>
+              <a:ext uri="{28A0092B-C50C-407E-A947-70E740481C1C}">
+                <a14:useLocalDpi xmlns:a14="http://schemas.microsoft.com/office/drawing/2010/main" val="0"/>
+              </a:ext>
+            </a:extLst>
+          </a:blip>
+          <a:stretch>
+            <a:fillRect/>
+          </a:stretch>
+        </p:blipFill>
+        <p:spPr>
+          <a:xfrm>
+            <a:off x="5214936" y="4210050"/>
+            <a:ext cx="6619875" cy="2419350"/>
+          </a:xfrm>
+          <a:prstGeom prst="rect">
+            <a:avLst/>
+          </a:prstGeom>
+        </p:spPr>
+      </p:pic>
     </p:spTree>
     <p:extLst>
       <p:ext uri="{BB962C8B-B14F-4D97-AF65-F5344CB8AC3E}">
@@ -4479,28 +5616,45 @@
           <a:p>
             <a:r>
               <a:rPr lang="en-US" dirty="0">
-                <a:latin typeface="Montserrat SemiBold" panose="00000700000000000000" pitchFamily="2" charset="0"/>
+                <a:solidFill>
+                  <a:srgbClr val="FFA161"/>
+                </a:solidFill>
+                <a:latin typeface="Montserrat Black" panose="00000A00000000000000" pitchFamily="2" charset="0"/>
               </a:rPr>
               <a:t>MEMS</a:t>
             </a:r>
             <a:r>
               <a:rPr lang="bg-BG" dirty="0">
-                <a:latin typeface="Montserrat SemiBold" panose="00000700000000000000" pitchFamily="2" charset="0"/>
+                <a:solidFill>
+                  <a:srgbClr val="FFA161"/>
+                </a:solidFill>
+                <a:latin typeface="Montserrat Black" panose="00000A00000000000000" pitchFamily="2" charset="0"/>
               </a:rPr>
               <a:t> </a:t>
             </a:r>
             <a:r>
               <a:rPr lang="bg-BG" dirty="0" err="1">
-                <a:latin typeface="Montserrat SemiBold" panose="00000700000000000000" pitchFamily="2" charset="0"/>
+                <a:solidFill>
+                  <a:srgbClr val="FFA161"/>
+                </a:solidFill>
+                <a:latin typeface="Montserrat Black" panose="00000A00000000000000" pitchFamily="2" charset="0"/>
               </a:rPr>
               <a:t>Акселерометри</a:t>
             </a:r>
             <a:br>
               <a:rPr lang="bg-BG" dirty="0">
-                <a:latin typeface="Montserrat SemiBold" panose="00000700000000000000" pitchFamily="2" charset="0"/>
+                <a:solidFill>
+                  <a:srgbClr val="FFA161"/>
+                </a:solidFill>
+                <a:latin typeface="Montserrat Black" panose="00000A00000000000000" pitchFamily="2" charset="0"/>
               </a:rPr>
             </a:br>
-            <a:endParaRPr lang="en-US" dirty="0"/>
+            <a:endParaRPr lang="en-US" dirty="0">
+              <a:solidFill>
+                <a:srgbClr val="FFA161"/>
+              </a:solidFill>
+              <a:latin typeface="Montserrat Black" panose="00000A00000000000000" pitchFamily="2" charset="0"/>
+            </a:endParaRPr>
           </a:p>
         </p:txBody>
       </p:sp>
@@ -4628,16 +5782,27 @@
           <a:p>
             <a:r>
               <a:rPr lang="bg-BG" dirty="0">
-                <a:latin typeface="Montserrat SemiBold" panose="00000700000000000000" pitchFamily="2" charset="0"/>
+                <a:solidFill>
+                  <a:srgbClr val="FFA161"/>
+                </a:solidFill>
+                <a:latin typeface="Montserrat Black" panose="00000A00000000000000" pitchFamily="2" charset="0"/>
               </a:rPr>
               <a:t>Запознаване с проблема</a:t>
             </a:r>
             <a:br>
               <a:rPr lang="bg-BG" dirty="0">
-                <a:latin typeface="Montserrat SemiBold" panose="00000700000000000000" pitchFamily="2" charset="0"/>
+                <a:solidFill>
+                  <a:srgbClr val="FFA161"/>
+                </a:solidFill>
+                <a:latin typeface="Montserrat Black" panose="00000A00000000000000" pitchFamily="2" charset="0"/>
               </a:rPr>
             </a:br>
-            <a:endParaRPr lang="en-US" dirty="0"/>
+            <a:endParaRPr lang="en-US" dirty="0">
+              <a:solidFill>
+                <a:srgbClr val="FFA161"/>
+              </a:solidFill>
+              <a:latin typeface="Montserrat Black" panose="00000A00000000000000" pitchFamily="2" charset="0"/>
+            </a:endParaRPr>
           </a:p>
         </p:txBody>
       </p:sp>
@@ -4660,13 +5825,142 @@
         <p:spPr/>
         <p:txBody>
           <a:bodyPr>
-            <a:normAutofit lnSpcReduction="10000"/>
+            <a:normAutofit fontScale="92500"/>
           </a:bodyPr>
           <a:lstStyle/>
           <a:p>
             <a:r>
-              <a:rPr lang="en-US" dirty="0"/>
+              <a:rPr lang="en-US" dirty="0">
+                <a:solidFill>
+                  <a:schemeClr val="tx1">
+                    <a:lumMod val="65000"/>
+                    <a:lumOff val="35000"/>
+                  </a:schemeClr>
+                </a:solidFill>
+                <a:latin typeface="Montserrat" panose="00000500000000000000" pitchFamily="2" charset="0"/>
+              </a:rPr>
               <a:t>Constant Bias</a:t>
+            </a:r>
+            <a:endParaRPr lang="bg-BG" dirty="0">
+              <a:solidFill>
+                <a:schemeClr val="tx1">
+                  <a:lumMod val="65000"/>
+                  <a:lumOff val="35000"/>
+                </a:schemeClr>
+              </a:solidFill>
+              <a:latin typeface="Montserrat" panose="00000500000000000000" pitchFamily="2" charset="0"/>
+            </a:endParaRPr>
+          </a:p>
+          <a:p>
+            <a:pPr marL="0" indent="0">
+              <a:buNone/>
+            </a:pPr>
+            <a:endParaRPr lang="bg-BG" dirty="0">
+              <a:solidFill>
+                <a:schemeClr val="tx1">
+                  <a:lumMod val="65000"/>
+                  <a:lumOff val="35000"/>
+                </a:schemeClr>
+              </a:solidFill>
+              <a:latin typeface="Montserrat" panose="00000500000000000000" pitchFamily="2" charset="0"/>
+            </a:endParaRPr>
+          </a:p>
+          <a:p>
+            <a:r>
+              <a:rPr lang="en-US" dirty="0">
+                <a:solidFill>
+                  <a:schemeClr val="tx1">
+                    <a:lumMod val="65000"/>
+                    <a:lumOff val="35000"/>
+                  </a:schemeClr>
+                </a:solidFill>
+                <a:latin typeface="Montserrat" panose="00000500000000000000" pitchFamily="2" charset="0"/>
+              </a:rPr>
+              <a:t>Calibration Errors</a:t>
+            </a:r>
+          </a:p>
+          <a:p>
+            <a:pPr marL="0" indent="0">
+              <a:buNone/>
+            </a:pPr>
+            <a:endParaRPr lang="bg-BG" dirty="0">
+              <a:solidFill>
+                <a:schemeClr val="tx1">
+                  <a:lumMod val="65000"/>
+                  <a:lumOff val="35000"/>
+                </a:schemeClr>
+              </a:solidFill>
+              <a:latin typeface="Montserrat" panose="00000500000000000000" pitchFamily="2" charset="0"/>
+            </a:endParaRPr>
+          </a:p>
+          <a:p>
+            <a:r>
+              <a:rPr lang="en-US" dirty="0">
+                <a:solidFill>
+                  <a:schemeClr val="tx1">
+                    <a:lumMod val="65000"/>
+                    <a:lumOff val="35000"/>
+                  </a:schemeClr>
+                </a:solidFill>
+                <a:latin typeface="Montserrat" panose="00000500000000000000" pitchFamily="2" charset="0"/>
+              </a:rPr>
+              <a:t>Thermo-Mechanical White Noise / Velocity Random Walk </a:t>
+            </a:r>
+          </a:p>
+          <a:p>
+            <a:pPr marL="0" indent="0">
+              <a:buNone/>
+            </a:pPr>
+            <a:endParaRPr lang="bg-BG" dirty="0">
+              <a:solidFill>
+                <a:schemeClr val="tx1">
+                  <a:lumMod val="65000"/>
+                  <a:lumOff val="35000"/>
+                </a:schemeClr>
+              </a:solidFill>
+              <a:latin typeface="Montserrat" panose="00000500000000000000" pitchFamily="2" charset="0"/>
+            </a:endParaRPr>
+          </a:p>
+          <a:p>
+            <a:r>
+              <a:rPr lang="en-US" dirty="0">
+                <a:solidFill>
+                  <a:schemeClr val="tx1">
+                    <a:lumMod val="65000"/>
+                    <a:lumOff val="35000"/>
+                  </a:schemeClr>
+                </a:solidFill>
+                <a:latin typeface="Montserrat" panose="00000500000000000000" pitchFamily="2" charset="0"/>
+              </a:rPr>
+              <a:t>Flicker Noise / Bias Stability</a:t>
+            </a:r>
+          </a:p>
+          <a:p>
+            <a:pPr marL="0" indent="0">
+              <a:buNone/>
+            </a:pPr>
+            <a:endParaRPr lang="bg-BG" dirty="0">
+              <a:solidFill>
+                <a:schemeClr val="tx1">
+                  <a:lumMod val="65000"/>
+                  <a:lumOff val="35000"/>
+                </a:schemeClr>
+              </a:solidFill>
+              <a:latin typeface="Montserrat" panose="00000500000000000000" pitchFamily="2" charset="0"/>
+            </a:endParaRPr>
+          </a:p>
+          <a:p>
+            <a:r>
+              <a:rPr lang="en-US" dirty="0">
+                <a:solidFill>
+                  <a:schemeClr val="tx1">
+                    <a:lumMod val="65000"/>
+                    <a:lumOff val="35000"/>
+                  </a:schemeClr>
+                </a:solidFill>
+                <a:latin typeface="Montserrat" panose="00000500000000000000" pitchFamily="2" charset="0"/>
+              </a:rPr>
+              <a:t>Temperature Effects</a:t>
             </a:r>
           </a:p>
           <a:p>
@@ -4674,48 +5968,6 @@
               <a:buNone/>
             </a:pPr>
             <a:endParaRPr lang="bg-BG" dirty="0"/>
-          </a:p>
-          <a:p>
-            <a:r>
-              <a:rPr lang="en-US" dirty="0"/>
-              <a:t>Thermo-Mechanical White Noise / Velocity Random Walk </a:t>
-            </a:r>
-          </a:p>
-          <a:p>
-            <a:pPr marL="0" indent="0">
-              <a:buNone/>
-            </a:pPr>
-            <a:endParaRPr lang="bg-BG" dirty="0"/>
-          </a:p>
-          <a:p>
-            <a:r>
-              <a:rPr lang="en-US" dirty="0"/>
-              <a:t>Flicker Noise / Bias Stability</a:t>
-            </a:r>
-          </a:p>
-          <a:p>
-            <a:pPr marL="0" indent="0">
-              <a:buNone/>
-            </a:pPr>
-            <a:endParaRPr lang="bg-BG" dirty="0"/>
-          </a:p>
-          <a:p>
-            <a:r>
-              <a:rPr lang="en-US" dirty="0"/>
-              <a:t>Temperature Effects</a:t>
-            </a:r>
-          </a:p>
-          <a:p>
-            <a:pPr marL="0" indent="0">
-              <a:buNone/>
-            </a:pPr>
-            <a:endParaRPr lang="bg-BG" dirty="0"/>
-          </a:p>
-          <a:p>
-            <a:r>
-              <a:rPr lang="en-US" dirty="0"/>
-              <a:t>Calibration Errors</a:t>
-            </a:r>
           </a:p>
         </p:txBody>
       </p:sp>
@@ -4771,10 +6023,20 @@
           <a:lstStyle/>
           <a:p>
             <a:r>
-              <a:rPr lang="bg-BG" dirty="0"/>
+              <a:rPr lang="bg-BG" b="1" dirty="0">
+                <a:solidFill>
+                  <a:srgbClr val="FFA161"/>
+                </a:solidFill>
+                <a:latin typeface="Montserrat Black" panose="00000A00000000000000" pitchFamily="2" charset="0"/>
+              </a:rPr>
               <a:t>Какво очакваме от сензора?</a:t>
             </a:r>
-            <a:endParaRPr lang="en-US" dirty="0"/>
+            <a:endParaRPr lang="en-US" b="1" dirty="0">
+              <a:solidFill>
+                <a:srgbClr val="FFA161"/>
+              </a:solidFill>
+              <a:latin typeface="Montserrat Black" panose="00000A00000000000000" pitchFamily="2" charset="0"/>
+            </a:endParaRPr>
           </a:p>
         </p:txBody>
       </p:sp>
@@ -4800,35 +6062,99 @@
           <a:lstStyle/>
           <a:p>
             <a:r>
-              <a:rPr lang="bg-BG" dirty="0"/>
+              <a:rPr lang="bg-BG" dirty="0">
+                <a:solidFill>
+                  <a:schemeClr val="tx1">
+                    <a:lumMod val="65000"/>
+                    <a:lumOff val="35000"/>
+                  </a:schemeClr>
+                </a:solidFill>
+                <a:latin typeface="Montserrat" panose="00000500000000000000" pitchFamily="2" charset="0"/>
+              </a:rPr>
               <a:t>Когато е не неподвижен и поставен хоризонтално спрямо</a:t>
             </a:r>
             <a:r>
-              <a:rPr lang="en-US" dirty="0"/>
+              <a:rPr lang="en-US" dirty="0">
+                <a:solidFill>
+                  <a:schemeClr val="tx1">
+                    <a:lumMod val="65000"/>
+                    <a:lumOff val="35000"/>
+                  </a:schemeClr>
+                </a:solidFill>
+                <a:latin typeface="Montserrat" panose="00000500000000000000" pitchFamily="2" charset="0"/>
+              </a:rPr>
               <a:t> XY </a:t>
             </a:r>
             <a:r>
-              <a:rPr lang="bg-BG" dirty="0"/>
+              <a:rPr lang="bg-BG" dirty="0">
+                <a:solidFill>
+                  <a:schemeClr val="tx1">
+                    <a:lumMod val="65000"/>
+                    <a:lumOff val="35000"/>
+                  </a:schemeClr>
+                </a:solidFill>
+                <a:latin typeface="Montserrat" panose="00000500000000000000" pitchFamily="2" charset="0"/>
+              </a:rPr>
               <a:t>равнината да дава измерване  (</a:t>
             </a:r>
             <a:r>
-              <a:rPr lang="en-US" dirty="0"/>
+              <a:rPr lang="en-US" dirty="0">
+                <a:solidFill>
+                  <a:schemeClr val="tx1">
+                    <a:lumMod val="65000"/>
+                    <a:lumOff val="35000"/>
+                  </a:schemeClr>
+                </a:solidFill>
+                <a:latin typeface="Montserrat" panose="00000500000000000000" pitchFamily="2" charset="0"/>
+              </a:rPr>
               <a:t>X,Y,Z</a:t>
             </a:r>
             <a:r>
-              <a:rPr lang="bg-BG" dirty="0"/>
+              <a:rPr lang="bg-BG" dirty="0">
+                <a:solidFill>
+                  <a:schemeClr val="tx1">
+                    <a:lumMod val="65000"/>
+                    <a:lumOff val="35000"/>
+                  </a:schemeClr>
+                </a:solidFill>
+                <a:latin typeface="Montserrat" panose="00000500000000000000" pitchFamily="2" charset="0"/>
+              </a:rPr>
               <a:t>)=(0,0,9.8)</a:t>
             </a:r>
           </a:p>
           <a:p>
-            <a:endParaRPr lang="bg-BG" dirty="0"/>
-          </a:p>
-          <a:p>
-            <a:r>
-              <a:rPr lang="bg-BG" dirty="0"/>
+            <a:endParaRPr lang="bg-BG" dirty="0">
+              <a:solidFill>
+                <a:schemeClr val="tx1">
+                  <a:lumMod val="65000"/>
+                  <a:lumOff val="35000"/>
+                </a:schemeClr>
+              </a:solidFill>
+              <a:latin typeface="Montserrat" panose="00000500000000000000" pitchFamily="2" charset="0"/>
+            </a:endParaRPr>
+          </a:p>
+          <a:p>
+            <a:r>
+              <a:rPr lang="bg-BG" dirty="0">
+                <a:solidFill>
+                  <a:schemeClr val="tx1">
+                    <a:lumMod val="65000"/>
+                    <a:lumOff val="35000"/>
+                  </a:schemeClr>
+                </a:solidFill>
+                <a:latin typeface="Montserrat" panose="00000500000000000000" pitchFamily="2" charset="0"/>
+              </a:rPr>
               <a:t>Това означава, че трябва а обработим суровите данни които идват от сензора.</a:t>
             </a:r>
-            <a:endParaRPr lang="en-US" dirty="0"/>
+            <a:endParaRPr lang="en-US" dirty="0">
+              <a:solidFill>
+                <a:schemeClr val="tx1">
+                  <a:lumMod val="65000"/>
+                  <a:lumOff val="35000"/>
+                </a:schemeClr>
+              </a:solidFill>
+              <a:latin typeface="Montserrat" panose="00000500000000000000" pitchFamily="2" charset="0"/>
+            </a:endParaRPr>
           </a:p>
           <a:p>
             <a:endParaRPr lang="en-US" dirty="0"/>
@@ -4887,10 +6213,20 @@
           <a:lstStyle/>
           <a:p>
             <a:r>
-              <a:rPr lang="bg-BG" dirty="0"/>
+              <a:rPr lang="bg-BG" b="1" dirty="0">
+                <a:solidFill>
+                  <a:srgbClr val="FFA161"/>
+                </a:solidFill>
+                <a:latin typeface="Montserrat Black" panose="00000A00000000000000" pitchFamily="2" charset="0"/>
+              </a:rPr>
               <a:t>Как се калибрират данните?</a:t>
             </a:r>
-            <a:endParaRPr lang="en-US" dirty="0"/>
+            <a:endParaRPr lang="en-US" b="1" dirty="0">
+              <a:solidFill>
+                <a:srgbClr val="FFA161"/>
+              </a:solidFill>
+              <a:latin typeface="Montserrat Black" panose="00000A00000000000000" pitchFamily="2" charset="0"/>
+            </a:endParaRPr>
           </a:p>
         </p:txBody>
       </p:sp>
@@ -4919,93 +6255,124 @@
               </a:xfrm>
             </p:spPr>
             <p:txBody>
-              <a:bodyPr/>
+              <a:bodyPr>
+                <a:normAutofit fontScale="92500" lnSpcReduction="20000"/>
+              </a:bodyPr>
               <a:lstStyle/>
               <a:p>
                 <a14:m>
                   <m:oMath xmlns:m="http://schemas.openxmlformats.org/officeDocument/2006/math">
-                    <m:sSub>
-                      <m:sSubPr>
+                    <m:d>
+                      <m:dPr>
                         <m:ctrlPr>
                           <a:rPr lang="en-US" i="1" smtClean="0">
+                            <a:solidFill>
+                              <a:schemeClr val="tx1">
+                                <a:lumMod val="65000"/>
+                                <a:lumOff val="35000"/>
+                              </a:schemeClr>
+                            </a:solidFill>
                             <a:latin typeface="Cambria Math" panose="02040503050406030204" pitchFamily="18" charset="0"/>
                           </a:rPr>
                         </m:ctrlPr>
-                      </m:sSubPr>
+                      </m:dPr>
                       <m:e>
-                        <m:d>
-                          <m:dPr>
+                        <m:m>
+                          <m:mPr>
+                            <m:mcs>
+                              <m:mc>
+                                <m:mcPr>
+                                  <m:count m:val="1"/>
+                                  <m:mcJc m:val="center"/>
+                                </m:mcPr>
+                              </m:mc>
+                            </m:mcs>
                             <m:ctrlPr>
                               <a:rPr lang="en-US" i="1">
+                                <a:solidFill>
+                                  <a:schemeClr val="tx1">
+                                    <a:lumMod val="65000"/>
+                                    <a:lumOff val="35000"/>
+                                  </a:schemeClr>
+                                </a:solidFill>
                                 <a:latin typeface="Cambria Math" panose="02040503050406030204" pitchFamily="18" charset="0"/>
                               </a:rPr>
                             </m:ctrlPr>
-                          </m:dPr>
-                          <m:e>
-                            <m:m>
-                              <m:mPr>
-                                <m:mcs>
-                                  <m:mc>
-                                    <m:mcPr>
-                                      <m:count m:val="1"/>
-                                      <m:mcJc m:val="center"/>
-                                    </m:mcPr>
-                                  </m:mc>
-                                </m:mcs>
-                                <m:ctrlPr>
-                                  <a:rPr lang="en-US" i="1">
-                                    <a:latin typeface="Cambria Math" panose="02040503050406030204" pitchFamily="18" charset="0"/>
-                                  </a:rPr>
-                                </m:ctrlPr>
-                              </m:mPr>
-                              <m:mr>
-                                <m:e>
-                                  <m:r>
-                                    <m:rPr>
-                                      <m:brk m:alnAt="7"/>
-                                    </m:rPr>
-                                    <a:rPr lang="en-US" i="1">
-                                      <a:latin typeface="Cambria Math" panose="02040503050406030204" pitchFamily="18" charset="0"/>
-                                    </a:rPr>
-                                    <m:t>𝑋</m:t>
-                                  </m:r>
-                                </m:e>
-                              </m:mr>
-                              <m:mr>
-                                <m:e>
-                                  <m:r>
-                                    <a:rPr lang="en-US" i="1">
-                                      <a:latin typeface="Cambria Math" panose="02040503050406030204" pitchFamily="18" charset="0"/>
-                                    </a:rPr>
-                                    <m:t>𝑌</m:t>
-                                  </m:r>
-                                </m:e>
-                              </m:mr>
-                              <m:mr>
-                                <m:e>
-                                  <m:r>
-                                    <a:rPr lang="en-US" i="1">
-                                      <a:latin typeface="Cambria Math" panose="02040503050406030204" pitchFamily="18" charset="0"/>
-                                    </a:rPr>
-                                    <m:t>𝑍</m:t>
-                                  </m:r>
-                                </m:e>
-                              </m:mr>
-                            </m:m>
-                          </m:e>
-                        </m:d>
+                          </m:mPr>
+                          <m:mr>
+                            <m:e>
+                              <m:r>
+                                <m:rPr>
+                                  <m:brk m:alnAt="7"/>
+                                </m:rPr>
+                                <a:rPr lang="en-US" i="1">
+                                  <a:solidFill>
+                                    <a:schemeClr val="tx1">
+                                      <a:lumMod val="65000"/>
+                                      <a:lumOff val="35000"/>
+                                    </a:schemeClr>
+                                  </a:solidFill>
+                                  <a:latin typeface="Cambria Math" panose="02040503050406030204" pitchFamily="18" charset="0"/>
+                                </a:rPr>
+                                <m:t>𝑋</m:t>
+                              </m:r>
+                            </m:e>
+                          </m:mr>
+                          <m:mr>
+                            <m:e>
+                              <m:r>
+                                <a:rPr lang="en-US" i="1">
+                                  <a:solidFill>
+                                    <a:schemeClr val="tx1">
+                                      <a:lumMod val="65000"/>
+                                      <a:lumOff val="35000"/>
+                                    </a:schemeClr>
+                                  </a:solidFill>
+                                  <a:latin typeface="Cambria Math" panose="02040503050406030204" pitchFamily="18" charset="0"/>
+                                </a:rPr>
+                                <m:t>𝑌</m:t>
+                              </m:r>
+                            </m:e>
+                          </m:mr>
+                          <m:mr>
+                            <m:e>
+                              <m:r>
+                                <a:rPr lang="en-US" i="1">
+                                  <a:solidFill>
+                                    <a:schemeClr val="tx1">
+                                      <a:lumMod val="65000"/>
+                                      <a:lumOff val="35000"/>
+                                    </a:schemeClr>
+                                  </a:solidFill>
+                                  <a:latin typeface="Cambria Math" panose="02040503050406030204" pitchFamily="18" charset="0"/>
+                                </a:rPr>
+                                <m:t>𝑍</m:t>
+                              </m:r>
+                            </m:e>
+                          </m:mr>
+                        </m:m>
                       </m:e>
-                      <m:sub>
-                        <m:r>
-                          <a:rPr lang="bg-BG" b="0" i="1" smtClean="0">
-                            <a:latin typeface="Cambria Math" panose="02040503050406030204" pitchFamily="18" charset="0"/>
-                          </a:rPr>
-                          <m:t>Калибрирани данни</m:t>
-                        </m:r>
-                      </m:sub>
-                    </m:sSub>
+                    </m:d>
                     <m:r>
                       <a:rPr lang="en-US" i="1">
+                        <a:solidFill>
+                          <a:schemeClr val="tx1">
+                            <a:lumMod val="65000"/>
+                            <a:lumOff val="35000"/>
+                          </a:schemeClr>
+                        </a:solidFill>
+                        <a:latin typeface="Cambria Math" panose="02040503050406030204" pitchFamily="18" charset="0"/>
+                      </a:rPr>
+                      <m:t> </m:t>
+                    </m:r>
+                    <m:r>
+                      <a:rPr lang="en-US" i="1">
+                        <a:solidFill>
+                          <a:schemeClr val="tx1">
+                            <a:lumMod val="65000"/>
+                            <a:lumOff val="35000"/>
+                          </a:schemeClr>
+                        </a:solidFill>
                         <a:latin typeface="Cambria Math" panose="02040503050406030204" pitchFamily="18" charset="0"/>
                       </a:rPr>
                       <m:t>=</m:t>
@@ -5014,6 +6381,12 @@
                       <m:dPr>
                         <m:ctrlPr>
                           <a:rPr lang="en-US" i="1">
+                            <a:solidFill>
+                              <a:schemeClr val="tx1">
+                                <a:lumMod val="65000"/>
+                                <a:lumOff val="35000"/>
+                              </a:schemeClr>
+                            </a:solidFill>
                             <a:latin typeface="Cambria Math" panose="02040503050406030204" pitchFamily="18" charset="0"/>
                           </a:rPr>
                         </m:ctrlPr>
@@ -5031,6 +6404,12 @@
                             </m:mcs>
                             <m:ctrlPr>
                               <a:rPr lang="en-US" i="1">
+                                <a:solidFill>
+                                  <a:schemeClr val="tx1">
+                                    <a:lumMod val="65000"/>
+                                    <a:lumOff val="35000"/>
+                                  </a:schemeClr>
+                                </a:solidFill>
                                 <a:latin typeface="Cambria Math" panose="02040503050406030204" pitchFamily="18" charset="0"/>
                               </a:rPr>
                             </m:ctrlPr>
@@ -5041,6 +6420,12 @@
                                 <m:sSubPr>
                                   <m:ctrlPr>
                                     <a:rPr lang="en-US" i="1">
+                                      <a:solidFill>
+                                        <a:schemeClr val="tx1">
+                                          <a:lumMod val="65000"/>
+                                          <a:lumOff val="35000"/>
+                                        </a:schemeClr>
+                                      </a:solidFill>
                                       <a:latin typeface="Cambria Math" panose="02040503050406030204" pitchFamily="18" charset="0"/>
                                     </a:rPr>
                                   </m:ctrlPr>
@@ -5048,6 +6433,12 @@
                                 <m:e>
                                   <m:r>
                                     <a:rPr lang="en-US" i="1">
+                                      <a:solidFill>
+                                        <a:schemeClr val="tx1">
+                                          <a:lumMod val="65000"/>
+                                          <a:lumOff val="35000"/>
+                                        </a:schemeClr>
+                                      </a:solidFill>
                                       <a:latin typeface="Cambria Math" panose="02040503050406030204" pitchFamily="18" charset="0"/>
                                     </a:rPr>
                                     <m:t>𝑀</m:t>
@@ -5056,6 +6447,12 @@
                                 <m:sub>
                                   <m:r>
                                     <a:rPr lang="en-US" i="1">
+                                      <a:solidFill>
+                                        <a:schemeClr val="tx1">
+                                          <a:lumMod val="65000"/>
+                                          <a:lumOff val="35000"/>
+                                        </a:schemeClr>
+                                      </a:solidFill>
                                       <a:latin typeface="Cambria Math" panose="02040503050406030204" pitchFamily="18" charset="0"/>
                                     </a:rPr>
                                     <m:t>𝑥𝑥</m:t>
@@ -5068,6 +6465,12 @@
                                 <m:sSubPr>
                                   <m:ctrlPr>
                                     <a:rPr lang="en-US" i="1">
+                                      <a:solidFill>
+                                        <a:schemeClr val="tx1">
+                                          <a:lumMod val="65000"/>
+                                          <a:lumOff val="35000"/>
+                                        </a:schemeClr>
+                                      </a:solidFill>
                                       <a:latin typeface="Cambria Math" panose="02040503050406030204" pitchFamily="18" charset="0"/>
                                     </a:rPr>
                                   </m:ctrlPr>
@@ -5075,6 +6478,12 @@
                                 <m:e>
                                   <m:r>
                                     <a:rPr lang="en-US" i="1">
+                                      <a:solidFill>
+                                        <a:schemeClr val="tx1">
+                                          <a:lumMod val="65000"/>
+                                          <a:lumOff val="35000"/>
+                                        </a:schemeClr>
+                                      </a:solidFill>
                                       <a:latin typeface="Cambria Math" panose="02040503050406030204" pitchFamily="18" charset="0"/>
                                     </a:rPr>
                                     <m:t>𝑀</m:t>
@@ -5083,6 +6492,12 @@
                                 <m:sub>
                                   <m:r>
                                     <a:rPr lang="en-US" i="1">
+                                      <a:solidFill>
+                                        <a:schemeClr val="tx1">
+                                          <a:lumMod val="65000"/>
+                                          <a:lumOff val="35000"/>
+                                        </a:schemeClr>
+                                      </a:solidFill>
                                       <a:latin typeface="Cambria Math" panose="02040503050406030204" pitchFamily="18" charset="0"/>
                                     </a:rPr>
                                     <m:t>𝑥𝑦</m:t>
@@ -5095,6 +6510,12 @@
                                 <m:sSubPr>
                                   <m:ctrlPr>
                                     <a:rPr lang="en-US" i="1">
+                                      <a:solidFill>
+                                        <a:schemeClr val="tx1">
+                                          <a:lumMod val="65000"/>
+                                          <a:lumOff val="35000"/>
+                                        </a:schemeClr>
+                                      </a:solidFill>
                                       <a:latin typeface="Cambria Math" panose="02040503050406030204" pitchFamily="18" charset="0"/>
                                     </a:rPr>
                                   </m:ctrlPr>
@@ -5102,6 +6523,12 @@
                                 <m:e>
                                   <m:r>
                                     <a:rPr lang="en-US" i="1">
+                                      <a:solidFill>
+                                        <a:schemeClr val="tx1">
+                                          <a:lumMod val="65000"/>
+                                          <a:lumOff val="35000"/>
+                                        </a:schemeClr>
+                                      </a:solidFill>
                                       <a:latin typeface="Cambria Math" panose="02040503050406030204" pitchFamily="18" charset="0"/>
                                     </a:rPr>
                                     <m:t>𝑀</m:t>
@@ -5110,6 +6537,12 @@
                                 <m:sub>
                                   <m:r>
                                     <a:rPr lang="en-US" i="1">
+                                      <a:solidFill>
+                                        <a:schemeClr val="tx1">
+                                          <a:lumMod val="65000"/>
+                                          <a:lumOff val="35000"/>
+                                        </a:schemeClr>
+                                      </a:solidFill>
                                       <a:latin typeface="Cambria Math" panose="02040503050406030204" pitchFamily="18" charset="0"/>
                                     </a:rPr>
                                     <m:t>𝑥𝑧</m:t>
@@ -5124,6 +6557,12 @@
                                 <m:sSubPr>
                                   <m:ctrlPr>
                                     <a:rPr lang="en-US" i="1">
+                                      <a:solidFill>
+                                        <a:schemeClr val="tx1">
+                                          <a:lumMod val="65000"/>
+                                          <a:lumOff val="35000"/>
+                                        </a:schemeClr>
+                                      </a:solidFill>
                                       <a:latin typeface="Cambria Math" panose="02040503050406030204" pitchFamily="18" charset="0"/>
                                     </a:rPr>
                                   </m:ctrlPr>
@@ -5131,6 +6570,12 @@
                                 <m:e>
                                   <m:r>
                                     <a:rPr lang="en-US" i="1">
+                                      <a:solidFill>
+                                        <a:schemeClr val="tx1">
+                                          <a:lumMod val="65000"/>
+                                          <a:lumOff val="35000"/>
+                                        </a:schemeClr>
+                                      </a:solidFill>
                                       <a:latin typeface="Cambria Math" panose="02040503050406030204" pitchFamily="18" charset="0"/>
                                     </a:rPr>
                                     <m:t>𝑀</m:t>
@@ -5139,6 +6584,12 @@
                                 <m:sub>
                                   <m:r>
                                     <a:rPr lang="en-US" i="1">
+                                      <a:solidFill>
+                                        <a:schemeClr val="tx1">
+                                          <a:lumMod val="65000"/>
+                                          <a:lumOff val="35000"/>
+                                        </a:schemeClr>
+                                      </a:solidFill>
                                       <a:latin typeface="Cambria Math" panose="02040503050406030204" pitchFamily="18" charset="0"/>
                                     </a:rPr>
                                     <m:t>𝑦𝑥</m:t>
@@ -5151,6 +6602,12 @@
                                 <m:sSubPr>
                                   <m:ctrlPr>
                                     <a:rPr lang="en-US" i="1">
+                                      <a:solidFill>
+                                        <a:schemeClr val="tx1">
+                                          <a:lumMod val="65000"/>
+                                          <a:lumOff val="35000"/>
+                                        </a:schemeClr>
+                                      </a:solidFill>
                                       <a:latin typeface="Cambria Math" panose="02040503050406030204" pitchFamily="18" charset="0"/>
                                     </a:rPr>
                                   </m:ctrlPr>
@@ -5158,6 +6615,12 @@
                                 <m:e>
                                   <m:r>
                                     <a:rPr lang="en-US" i="1">
+                                      <a:solidFill>
+                                        <a:schemeClr val="tx1">
+                                          <a:lumMod val="65000"/>
+                                          <a:lumOff val="35000"/>
+                                        </a:schemeClr>
+                                      </a:solidFill>
                                       <a:latin typeface="Cambria Math" panose="02040503050406030204" pitchFamily="18" charset="0"/>
                                     </a:rPr>
                                     <m:t>𝑀</m:t>
@@ -5166,6 +6629,12 @@
                                 <m:sub>
                                   <m:r>
                                     <a:rPr lang="en-US" i="1">
+                                      <a:solidFill>
+                                        <a:schemeClr val="tx1">
+                                          <a:lumMod val="65000"/>
+                                          <a:lumOff val="35000"/>
+                                        </a:schemeClr>
+                                      </a:solidFill>
                                       <a:latin typeface="Cambria Math" panose="02040503050406030204" pitchFamily="18" charset="0"/>
                                     </a:rPr>
                                     <m:t>𝑦𝑦</m:t>
@@ -5178,6 +6647,12 @@
                                 <m:sSubPr>
                                   <m:ctrlPr>
                                     <a:rPr lang="en-US" i="1">
+                                      <a:solidFill>
+                                        <a:schemeClr val="tx1">
+                                          <a:lumMod val="65000"/>
+                                          <a:lumOff val="35000"/>
+                                        </a:schemeClr>
+                                      </a:solidFill>
                                       <a:latin typeface="Cambria Math" panose="02040503050406030204" pitchFamily="18" charset="0"/>
                                     </a:rPr>
                                   </m:ctrlPr>
@@ -5185,6 +6660,12 @@
                                 <m:e>
                                   <m:r>
                                     <a:rPr lang="en-US" i="1">
+                                      <a:solidFill>
+                                        <a:schemeClr val="tx1">
+                                          <a:lumMod val="65000"/>
+                                          <a:lumOff val="35000"/>
+                                        </a:schemeClr>
+                                      </a:solidFill>
                                       <a:latin typeface="Cambria Math" panose="02040503050406030204" pitchFamily="18" charset="0"/>
                                     </a:rPr>
                                     <m:t>𝑀</m:t>
@@ -5193,6 +6674,12 @@
                                 <m:sub>
                                   <m:r>
                                     <a:rPr lang="en-US" i="1">
+                                      <a:solidFill>
+                                        <a:schemeClr val="tx1">
+                                          <a:lumMod val="65000"/>
+                                          <a:lumOff val="35000"/>
+                                        </a:schemeClr>
+                                      </a:solidFill>
                                       <a:latin typeface="Cambria Math" panose="02040503050406030204" pitchFamily="18" charset="0"/>
                                     </a:rPr>
                                     <m:t>𝑦𝑧</m:t>
@@ -5207,6 +6694,12 @@
                                 <m:sSubPr>
                                   <m:ctrlPr>
                                     <a:rPr lang="en-US" i="1">
+                                      <a:solidFill>
+                                        <a:schemeClr val="tx1">
+                                          <a:lumMod val="65000"/>
+                                          <a:lumOff val="35000"/>
+                                        </a:schemeClr>
+                                      </a:solidFill>
                                       <a:latin typeface="Cambria Math" panose="02040503050406030204" pitchFamily="18" charset="0"/>
                                     </a:rPr>
                                   </m:ctrlPr>
@@ -5214,6 +6707,12 @@
                                 <m:e>
                                   <m:r>
                                     <a:rPr lang="en-US" i="1">
+                                      <a:solidFill>
+                                        <a:schemeClr val="tx1">
+                                          <a:lumMod val="65000"/>
+                                          <a:lumOff val="35000"/>
+                                        </a:schemeClr>
+                                      </a:solidFill>
                                       <a:latin typeface="Cambria Math" panose="02040503050406030204" pitchFamily="18" charset="0"/>
                                     </a:rPr>
                                     <m:t>𝑀</m:t>
@@ -5222,6 +6721,12 @@
                                 <m:sub>
                                   <m:r>
                                     <a:rPr lang="en-US" i="1">
+                                      <a:solidFill>
+                                        <a:schemeClr val="tx1">
+                                          <a:lumMod val="65000"/>
+                                          <a:lumOff val="35000"/>
+                                        </a:schemeClr>
+                                      </a:solidFill>
                                       <a:latin typeface="Cambria Math" panose="02040503050406030204" pitchFamily="18" charset="0"/>
                                     </a:rPr>
                                     <m:t>𝑧𝑥</m:t>
@@ -5234,6 +6739,12 @@
                                 <m:sSubPr>
                                   <m:ctrlPr>
                                     <a:rPr lang="en-US" i="1">
+                                      <a:solidFill>
+                                        <a:schemeClr val="tx1">
+                                          <a:lumMod val="65000"/>
+                                          <a:lumOff val="35000"/>
+                                        </a:schemeClr>
+                                      </a:solidFill>
                                       <a:latin typeface="Cambria Math" panose="02040503050406030204" pitchFamily="18" charset="0"/>
                                     </a:rPr>
                                   </m:ctrlPr>
@@ -5241,6 +6752,12 @@
                                 <m:e>
                                   <m:r>
                                     <a:rPr lang="en-US" i="1">
+                                      <a:solidFill>
+                                        <a:schemeClr val="tx1">
+                                          <a:lumMod val="65000"/>
+                                          <a:lumOff val="35000"/>
+                                        </a:schemeClr>
+                                      </a:solidFill>
                                       <a:latin typeface="Cambria Math" panose="02040503050406030204" pitchFamily="18" charset="0"/>
                                     </a:rPr>
                                     <m:t>𝑀</m:t>
@@ -5249,6 +6766,12 @@
                                 <m:sub>
                                   <m:r>
                                     <a:rPr lang="en-US" i="1">
+                                      <a:solidFill>
+                                        <a:schemeClr val="tx1">
+                                          <a:lumMod val="65000"/>
+                                          <a:lumOff val="35000"/>
+                                        </a:schemeClr>
+                                      </a:solidFill>
                                       <a:latin typeface="Cambria Math" panose="02040503050406030204" pitchFamily="18" charset="0"/>
                                     </a:rPr>
                                     <m:t>𝑧𝑦</m:t>
@@ -5261,6 +6784,12 @@
                                 <m:sSubPr>
                                   <m:ctrlPr>
                                     <a:rPr lang="en-US" i="1">
+                                      <a:solidFill>
+                                        <a:schemeClr val="tx1">
+                                          <a:lumMod val="65000"/>
+                                          <a:lumOff val="35000"/>
+                                        </a:schemeClr>
+                                      </a:solidFill>
                                       <a:latin typeface="Cambria Math" panose="02040503050406030204" pitchFamily="18" charset="0"/>
                                     </a:rPr>
                                   </m:ctrlPr>
@@ -5268,6 +6797,12 @@
                                 <m:e>
                                   <m:r>
                                     <a:rPr lang="en-US" i="1">
+                                      <a:solidFill>
+                                        <a:schemeClr val="tx1">
+                                          <a:lumMod val="65000"/>
+                                          <a:lumOff val="35000"/>
+                                        </a:schemeClr>
+                                      </a:solidFill>
                                       <a:latin typeface="Cambria Math" panose="02040503050406030204" pitchFamily="18" charset="0"/>
                                     </a:rPr>
                                     <m:t>𝑀</m:t>
@@ -5276,6 +6811,12 @@
                                 <m:sub>
                                   <m:r>
                                     <a:rPr lang="en-US" i="1">
+                                      <a:solidFill>
+                                        <a:schemeClr val="tx1">
+                                          <a:lumMod val="65000"/>
+                                          <a:lumOff val="35000"/>
+                                        </a:schemeClr>
+                                      </a:solidFill>
                                       <a:latin typeface="Cambria Math" panose="02040503050406030204" pitchFamily="18" charset="0"/>
                                     </a:rPr>
                                     <m:t>𝑧𝑧</m:t>
@@ -5289,160 +6830,26 @@
                     </m:d>
                     <m:r>
                       <a:rPr lang="en-US" i="1">
+                        <a:solidFill>
+                          <a:schemeClr val="tx1">
+                            <a:lumMod val="65000"/>
+                            <a:lumOff val="35000"/>
+                          </a:schemeClr>
+                        </a:solidFill>
                         <a:latin typeface="Cambria Math" panose="02040503050406030204" pitchFamily="18" charset="0"/>
                       </a:rPr>
                       <m:t>.</m:t>
-                    </m:r>
-                    <m:r>
-                      <a:rPr lang="en-US" i="1" smtClean="0">
-                        <a:latin typeface="Cambria Math" panose="02040503050406030204" pitchFamily="18" charset="0"/>
-                      </a:rPr>
-                      <m:t> </m:t>
-                    </m:r>
-                    <m:sSub>
-                      <m:sSubPr>
-                        <m:ctrlPr>
-                          <a:rPr lang="en-US" i="1" smtClean="0">
-                            <a:latin typeface="Cambria Math" panose="02040503050406030204" pitchFamily="18" charset="0"/>
-                          </a:rPr>
-                        </m:ctrlPr>
-                      </m:sSubPr>
-                      <m:e>
-                        <m:d>
-                          <m:dPr>
-                            <m:ctrlPr>
-                              <a:rPr lang="en-US" i="1">
-                                <a:latin typeface="Cambria Math" panose="02040503050406030204" pitchFamily="18" charset="0"/>
-                              </a:rPr>
-                            </m:ctrlPr>
-                          </m:dPr>
-                          <m:e>
-                            <m:m>
-                              <m:mPr>
-                                <m:mcs>
-                                  <m:mc>
-                                    <m:mcPr>
-                                      <m:count m:val="1"/>
-                                      <m:mcJc m:val="center"/>
-                                    </m:mcPr>
-                                  </m:mc>
-                                </m:mcs>
-                                <m:ctrlPr>
-                                  <a:rPr lang="en-US" i="1">
-                                    <a:latin typeface="Cambria Math" panose="02040503050406030204" pitchFamily="18" charset="0"/>
-                                  </a:rPr>
-                                </m:ctrlPr>
-                              </m:mPr>
-                              <m:mr>
-                                <m:e>
-                                  <m:sSup>
-                                    <m:sSupPr>
-                                      <m:ctrlPr>
-                                        <a:rPr lang="en-US" i="1">
-                                          <a:latin typeface="Cambria Math" panose="02040503050406030204" pitchFamily="18" charset="0"/>
-                                        </a:rPr>
-                                      </m:ctrlPr>
-                                    </m:sSupPr>
-                                    <m:e>
-                                      <m:r>
-                                        <a:rPr lang="en-US" i="1">
-                                          <a:latin typeface="Cambria Math" panose="02040503050406030204" pitchFamily="18" charset="0"/>
-                                        </a:rPr>
-                                        <m:t>𝑋</m:t>
-                                      </m:r>
-                                    </m:e>
-                                    <m:sup>
-                                      <m:r>
-                                        <a:rPr lang="en-US" i="1">
-                                          <a:latin typeface="Cambria Math" panose="02040503050406030204" pitchFamily="18" charset="0"/>
-                                        </a:rPr>
-                                        <m:t>^</m:t>
-                                      </m:r>
-                                    </m:sup>
-                                  </m:sSup>
-                                </m:e>
-                              </m:mr>
-                              <m:mr>
-                                <m:e>
-                                  <m:sSup>
-                                    <m:sSupPr>
-                                      <m:ctrlPr>
-                                        <a:rPr lang="en-US" i="1">
-                                          <a:latin typeface="Cambria Math" panose="02040503050406030204" pitchFamily="18" charset="0"/>
-                                        </a:rPr>
-                                      </m:ctrlPr>
-                                    </m:sSupPr>
-                                    <m:e>
-                                      <m:r>
-                                        <a:rPr lang="en-US" i="1">
-                                          <a:latin typeface="Cambria Math" panose="02040503050406030204" pitchFamily="18" charset="0"/>
-                                        </a:rPr>
-                                        <m:t>𝑌</m:t>
-                                      </m:r>
-                                    </m:e>
-                                    <m:sup>
-                                      <m:r>
-                                        <a:rPr lang="en-US" i="1">
-                                          <a:latin typeface="Cambria Math" panose="02040503050406030204" pitchFamily="18" charset="0"/>
-                                        </a:rPr>
-                                        <m:t>^</m:t>
-                                      </m:r>
-                                    </m:sup>
-                                  </m:sSup>
-                                </m:e>
-                              </m:mr>
-                              <m:mr>
-                                <m:e>
-                                  <m:sSup>
-                                    <m:sSupPr>
-                                      <m:ctrlPr>
-                                        <a:rPr lang="en-US" i="1">
-                                          <a:latin typeface="Cambria Math" panose="02040503050406030204" pitchFamily="18" charset="0"/>
-                                        </a:rPr>
-                                      </m:ctrlPr>
-                                    </m:sSupPr>
-                                    <m:e>
-                                      <m:r>
-                                        <a:rPr lang="en-US" i="1">
-                                          <a:latin typeface="Cambria Math" panose="02040503050406030204" pitchFamily="18" charset="0"/>
-                                        </a:rPr>
-                                        <m:t>𝑍</m:t>
-                                      </m:r>
-                                    </m:e>
-                                    <m:sup>
-                                      <m:r>
-                                        <a:rPr lang="en-US" i="1">
-                                          <a:latin typeface="Cambria Math" panose="02040503050406030204" pitchFamily="18" charset="0"/>
-                                        </a:rPr>
-                                        <m:t>^</m:t>
-                                      </m:r>
-                                    </m:sup>
-                                  </m:sSup>
-                                </m:e>
-                              </m:mr>
-                            </m:m>
-                          </m:e>
-                        </m:d>
-                      </m:e>
-                      <m:sub>
-                        <m:r>
-                          <a:rPr lang="bg-BG" b="0" i="1" smtClean="0">
-                            <a:latin typeface="Cambria Math" panose="02040503050406030204" pitchFamily="18" charset="0"/>
-                          </a:rPr>
-                          <m:t>Сурови данни</m:t>
-                        </m:r>
-                      </m:sub>
-                    </m:sSub>
-                    <m:r>
-                      <a:rPr lang="bg-BG" b="0" i="1" smtClean="0">
-                        <a:latin typeface="Cambria Math" panose="02040503050406030204" pitchFamily="18" charset="0"/>
-                      </a:rPr>
-                      <m:t>+</m:t>
                     </m:r>
                     <m:d>
                       <m:dPr>
                         <m:ctrlPr>
                           <a:rPr lang="en-US" i="1">
+                            <a:solidFill>
+                              <a:schemeClr val="tx1">
+                                <a:lumMod val="65000"/>
+                                <a:lumOff val="35000"/>
+                              </a:schemeClr>
+                            </a:solidFill>
                             <a:latin typeface="Cambria Math" panose="02040503050406030204" pitchFamily="18" charset="0"/>
                           </a:rPr>
                         </m:ctrlPr>
@@ -5460,6 +6867,166 @@
                             </m:mcs>
                             <m:ctrlPr>
                               <a:rPr lang="en-US" i="1">
+                                <a:solidFill>
+                                  <a:schemeClr val="tx1">
+                                    <a:lumMod val="65000"/>
+                                    <a:lumOff val="35000"/>
+                                  </a:schemeClr>
+                                </a:solidFill>
+                                <a:latin typeface="Cambria Math" panose="02040503050406030204" pitchFamily="18" charset="0"/>
+                              </a:rPr>
+                            </m:ctrlPr>
+                          </m:mPr>
+                          <m:mr>
+                            <m:e>
+                              <m:acc>
+                                <m:accPr>
+                                  <m:chr m:val="̂"/>
+                                  <m:ctrlPr>
+                                    <a:rPr lang="en-US" i="1">
+                                      <a:solidFill>
+                                        <a:schemeClr val="tx1">
+                                          <a:lumMod val="65000"/>
+                                          <a:lumOff val="35000"/>
+                                        </a:schemeClr>
+                                      </a:solidFill>
+                                      <a:latin typeface="Cambria Math" panose="02040503050406030204" pitchFamily="18" charset="0"/>
+                                    </a:rPr>
+                                  </m:ctrlPr>
+                                </m:accPr>
+                                <m:e>
+                                  <m:r>
+                                    <a:rPr lang="en-US" i="1">
+                                      <a:solidFill>
+                                        <a:schemeClr val="tx1">
+                                          <a:lumMod val="65000"/>
+                                          <a:lumOff val="35000"/>
+                                        </a:schemeClr>
+                                      </a:solidFill>
+                                      <a:latin typeface="Cambria Math" panose="02040503050406030204" pitchFamily="18" charset="0"/>
+                                    </a:rPr>
+                                    <m:t>𝑋</m:t>
+                                  </m:r>
+                                </m:e>
+                              </m:acc>
+                            </m:e>
+                          </m:mr>
+                          <m:mr>
+                            <m:e>
+                              <m:acc>
+                                <m:accPr>
+                                  <m:chr m:val="̂"/>
+                                  <m:ctrlPr>
+                                    <a:rPr lang="en-US" i="1">
+                                      <a:solidFill>
+                                        <a:schemeClr val="tx1">
+                                          <a:lumMod val="65000"/>
+                                          <a:lumOff val="35000"/>
+                                        </a:schemeClr>
+                                      </a:solidFill>
+                                      <a:latin typeface="Cambria Math" panose="02040503050406030204" pitchFamily="18" charset="0"/>
+                                    </a:rPr>
+                                  </m:ctrlPr>
+                                </m:accPr>
+                                <m:e>
+                                  <m:r>
+                                    <a:rPr lang="en-US" i="1">
+                                      <a:solidFill>
+                                        <a:schemeClr val="tx1">
+                                          <a:lumMod val="65000"/>
+                                          <a:lumOff val="35000"/>
+                                        </a:schemeClr>
+                                      </a:solidFill>
+                                      <a:latin typeface="Cambria Math" panose="02040503050406030204" pitchFamily="18" charset="0"/>
+                                    </a:rPr>
+                                    <m:t>𝑌</m:t>
+                                  </m:r>
+                                </m:e>
+                              </m:acc>
+                            </m:e>
+                          </m:mr>
+                          <m:mr>
+                            <m:e>
+                              <m:acc>
+                                <m:accPr>
+                                  <m:chr m:val="̂"/>
+                                  <m:ctrlPr>
+                                    <a:rPr lang="en-US" i="1">
+                                      <a:solidFill>
+                                        <a:schemeClr val="tx1">
+                                          <a:lumMod val="65000"/>
+                                          <a:lumOff val="35000"/>
+                                        </a:schemeClr>
+                                      </a:solidFill>
+                                      <a:latin typeface="Cambria Math" panose="02040503050406030204" pitchFamily="18" charset="0"/>
+                                    </a:rPr>
+                                  </m:ctrlPr>
+                                </m:accPr>
+                                <m:e>
+                                  <m:r>
+                                    <a:rPr lang="en-US" i="1">
+                                      <a:solidFill>
+                                        <a:schemeClr val="tx1">
+                                          <a:lumMod val="65000"/>
+                                          <a:lumOff val="35000"/>
+                                        </a:schemeClr>
+                                      </a:solidFill>
+                                      <a:latin typeface="Cambria Math" panose="02040503050406030204" pitchFamily="18" charset="0"/>
+                                    </a:rPr>
+                                    <m:t>𝑍</m:t>
+                                  </m:r>
+                                </m:e>
+                              </m:acc>
+                            </m:e>
+                          </m:mr>
+                        </m:m>
+                      </m:e>
+                    </m:d>
+                    <m:r>
+                      <a:rPr lang="bg-BG" b="0" i="1" smtClean="0">
+                        <a:solidFill>
+                          <a:schemeClr val="tx1">
+                            <a:lumMod val="65000"/>
+                            <a:lumOff val="35000"/>
+                          </a:schemeClr>
+                        </a:solidFill>
+                        <a:latin typeface="Cambria Math" panose="02040503050406030204" pitchFamily="18" charset="0"/>
+                      </a:rPr>
+                      <m:t>+</m:t>
+                    </m:r>
+                    <m:d>
+                      <m:dPr>
+                        <m:ctrlPr>
+                          <a:rPr lang="en-US" i="1">
+                            <a:solidFill>
+                              <a:schemeClr val="tx1">
+                                <a:lumMod val="65000"/>
+                                <a:lumOff val="35000"/>
+                              </a:schemeClr>
+                            </a:solidFill>
+                            <a:latin typeface="Cambria Math" panose="02040503050406030204" pitchFamily="18" charset="0"/>
+                          </a:rPr>
+                        </m:ctrlPr>
+                      </m:dPr>
+                      <m:e>
+                        <m:m>
+                          <m:mPr>
+                            <m:mcs>
+                              <m:mc>
+                                <m:mcPr>
+                                  <m:count m:val="1"/>
+                                  <m:mcJc m:val="center"/>
+                                </m:mcPr>
+                              </m:mc>
+                            </m:mcs>
+                            <m:ctrlPr>
+                              <a:rPr lang="en-US" i="1">
+                                <a:solidFill>
+                                  <a:schemeClr val="tx1">
+                                    <a:lumMod val="65000"/>
+                                    <a:lumOff val="35000"/>
+                                  </a:schemeClr>
+                                </a:solidFill>
                                 <a:latin typeface="Cambria Math" panose="02040503050406030204" pitchFamily="18" charset="0"/>
                               </a:rPr>
                             </m:ctrlPr>
@@ -5470,6 +7037,12 @@
                                 <m:sSubPr>
                                   <m:ctrlPr>
                                     <a:rPr lang="en-US" i="1">
+                                      <a:solidFill>
+                                        <a:schemeClr val="tx1">
+                                          <a:lumMod val="65000"/>
+                                          <a:lumOff val="35000"/>
+                                        </a:schemeClr>
+                                      </a:solidFill>
                                       <a:latin typeface="Cambria Math" panose="02040503050406030204" pitchFamily="18" charset="0"/>
                                     </a:rPr>
                                   </m:ctrlPr>
@@ -5477,6 +7050,12 @@
                                 <m:e>
                                   <m:r>
                                     <a:rPr lang="en-US" i="1">
+                                      <a:solidFill>
+                                        <a:schemeClr val="tx1">
+                                          <a:lumMod val="65000"/>
+                                          <a:lumOff val="35000"/>
+                                        </a:schemeClr>
+                                      </a:solidFill>
                                       <a:latin typeface="Cambria Math" panose="02040503050406030204" pitchFamily="18" charset="0"/>
                                     </a:rPr>
                                     <m:t>𝐵</m:t>
@@ -5485,6 +7064,12 @@
                                 <m:sub>
                                   <m:r>
                                     <a:rPr lang="en-US" i="1">
+                                      <a:solidFill>
+                                        <a:schemeClr val="tx1">
+                                          <a:lumMod val="65000"/>
+                                          <a:lumOff val="35000"/>
+                                        </a:schemeClr>
+                                      </a:solidFill>
                                       <a:latin typeface="Cambria Math" panose="02040503050406030204" pitchFamily="18" charset="0"/>
                                     </a:rPr>
                                     <m:t>𝑥</m:t>
@@ -5499,6 +7084,12 @@
                                 <m:sSubPr>
                                   <m:ctrlPr>
                                     <a:rPr lang="en-US" i="1">
+                                      <a:solidFill>
+                                        <a:schemeClr val="tx1">
+                                          <a:lumMod val="65000"/>
+                                          <a:lumOff val="35000"/>
+                                        </a:schemeClr>
+                                      </a:solidFill>
                                       <a:latin typeface="Cambria Math" panose="02040503050406030204" pitchFamily="18" charset="0"/>
                                     </a:rPr>
                                   </m:ctrlPr>
@@ -5506,6 +7097,12 @@
                                 <m:e>
                                   <m:r>
                                     <a:rPr lang="en-US" i="1">
+                                      <a:solidFill>
+                                        <a:schemeClr val="tx1">
+                                          <a:lumMod val="65000"/>
+                                          <a:lumOff val="35000"/>
+                                        </a:schemeClr>
+                                      </a:solidFill>
                                       <a:latin typeface="Cambria Math" panose="02040503050406030204" pitchFamily="18" charset="0"/>
                                     </a:rPr>
                                     <m:t>𝐵</m:t>
@@ -5514,6 +7111,12 @@
                                 <m:sub>
                                   <m:r>
                                     <a:rPr lang="en-US" i="1">
+                                      <a:solidFill>
+                                        <a:schemeClr val="tx1">
+                                          <a:lumMod val="65000"/>
+                                          <a:lumOff val="35000"/>
+                                        </a:schemeClr>
+                                      </a:solidFill>
                                       <a:latin typeface="Cambria Math" panose="02040503050406030204" pitchFamily="18" charset="0"/>
                                     </a:rPr>
                                     <m:t>𝑦</m:t>
@@ -5528,6 +7131,12 @@
                                 <m:sSubPr>
                                   <m:ctrlPr>
                                     <a:rPr lang="en-US" i="1">
+                                      <a:solidFill>
+                                        <a:schemeClr val="tx1">
+                                          <a:lumMod val="65000"/>
+                                          <a:lumOff val="35000"/>
+                                        </a:schemeClr>
+                                      </a:solidFill>
                                       <a:latin typeface="Cambria Math" panose="02040503050406030204" pitchFamily="18" charset="0"/>
                                     </a:rPr>
                                   </m:ctrlPr>
@@ -5535,6 +7144,12 @@
                                 <m:e>
                                   <m:r>
                                     <a:rPr lang="en-US" i="1">
+                                      <a:solidFill>
+                                        <a:schemeClr val="tx1">
+                                          <a:lumMod val="65000"/>
+                                          <a:lumOff val="35000"/>
+                                        </a:schemeClr>
+                                      </a:solidFill>
                                       <a:latin typeface="Cambria Math" panose="02040503050406030204" pitchFamily="18" charset="0"/>
                                     </a:rPr>
                                     <m:t>𝐵</m:t>
@@ -5543,6 +7158,12 @@
                                 <m:sub>
                                   <m:r>
                                     <a:rPr lang="en-US" i="1">
+                                      <a:solidFill>
+                                        <a:schemeClr val="tx1">
+                                          <a:lumMod val="65000"/>
+                                          <a:lumOff val="35000"/>
+                                        </a:schemeClr>
+                                      </a:solidFill>
                                       <a:latin typeface="Cambria Math" panose="02040503050406030204" pitchFamily="18" charset="0"/>
                                     </a:rPr>
                                     <m:t>𝑧</m:t>
@@ -5556,36 +7177,172 @@
                     </m:d>
                   </m:oMath>
                 </a14:m>
-                <a:endParaRPr lang="bg-BG" b="1" dirty="0"/>
+                <a:endParaRPr lang="en-US" b="1" dirty="0">
+                  <a:solidFill>
+                    <a:schemeClr val="tx1">
+                      <a:lumMod val="65000"/>
+                      <a:lumOff val="35000"/>
+                    </a:schemeClr>
+                  </a:solidFill>
+                  <a:latin typeface="Montserrat" panose="00000500000000000000" pitchFamily="2" charset="0"/>
+                </a:endParaRPr>
+              </a:p>
+              <a:p>
+                <a:pPr marL="0" indent="0">
+                  <a:buNone/>
+                </a:pPr>
+                <a:endParaRPr lang="bg-BG" b="1" dirty="0">
+                  <a:solidFill>
+                    <a:schemeClr val="tx1">
+                      <a:lumMod val="65000"/>
+                      <a:lumOff val="35000"/>
+                    </a:schemeClr>
+                  </a:solidFill>
+                  <a:latin typeface="Montserrat" panose="00000500000000000000" pitchFamily="2" charset="0"/>
+                </a:endParaRPr>
               </a:p>
               <a:p>
                 <a:r>
-                  <a:rPr lang="bg-BG" dirty="0"/>
+                  <a:rPr lang="bg-BG" sz="2600" dirty="0">
+                    <a:solidFill>
+                      <a:schemeClr val="tx1">
+                        <a:lumMod val="65000"/>
+                        <a:lumOff val="35000"/>
+                      </a:schemeClr>
+                    </a:solidFill>
+                    <a:latin typeface="Montserrat" panose="00000500000000000000" pitchFamily="2" charset="0"/>
+                  </a:rPr>
                   <a:t>Знаем, че правилно сме калибрирали данните когато: </a:t>
                 </a:r>
                 <a:br>
-                  <a:rPr lang="bg-BG" dirty="0"/>
+                  <a:rPr lang="bg-BG" sz="2600" dirty="0">
+                    <a:solidFill>
+                      <a:schemeClr val="tx1">
+                        <a:lumMod val="65000"/>
+                        <a:lumOff val="35000"/>
+                      </a:schemeClr>
+                    </a:solidFill>
+                    <a:latin typeface="Montserrat" panose="00000500000000000000" pitchFamily="2" charset="0"/>
+                  </a:rPr>
                 </a:br>
                 <a:r>
-                  <a:rPr lang="bg-BG" dirty="0"/>
+                  <a:rPr lang="bg-BG" sz="2600" dirty="0">
+                    <a:solidFill>
+                      <a:schemeClr val="tx1">
+                        <a:lumMod val="65000"/>
+                        <a:lumOff val="35000"/>
+                      </a:schemeClr>
+                    </a:solidFill>
+                    <a:latin typeface="Montserrat" panose="00000500000000000000" pitchFamily="2" charset="0"/>
+                  </a:rPr>
                   <a:t>(</a:t>
                 </a:r>
                 <a:r>
-                  <a:rPr lang="bg-BG" dirty="0" err="1"/>
+                  <a:rPr lang="bg-BG" sz="2600" dirty="0" err="1">
+                    <a:solidFill>
+                      <a:schemeClr val="tx1">
+                        <a:lumMod val="65000"/>
+                        <a:lumOff val="35000"/>
+                      </a:schemeClr>
+                    </a:solidFill>
+                    <a:latin typeface="Montserrat" panose="00000500000000000000" pitchFamily="2" charset="0"/>
+                  </a:rPr>
                   <a:t>нормамта</a:t>
                 </a:r>
                 <a:r>
-                  <a:rPr lang="bg-BG" dirty="0"/>
-                  <a:t> на данните)-</a:t>
+                  <a:rPr lang="bg-BG" sz="2600" dirty="0">
+                    <a:solidFill>
+                      <a:schemeClr val="tx1">
+                        <a:lumMod val="65000"/>
+                        <a:lumOff val="35000"/>
+                      </a:schemeClr>
+                    </a:solidFill>
+                    <a:latin typeface="Montserrat" panose="00000500000000000000" pitchFamily="2" charset="0"/>
+                  </a:rPr>
+                  <a:t> на вектора на ускорението)-</a:t>
                 </a:r>
-                <a:r>
-                  <a:rPr lang="en-US" dirty="0"/>
-                  <a:t>g^2=0</a:t>
-                </a:r>
+                <a14:m>
+                  <m:oMath xmlns:m="http://schemas.openxmlformats.org/officeDocument/2006/math">
+                    <m:sSup>
+                      <m:sSupPr>
+                        <m:ctrlPr>
+                          <a:rPr lang="en-US" sz="2600" b="0" i="1" smtClean="0">
+                            <a:solidFill>
+                              <a:schemeClr val="tx1">
+                                <a:lumMod val="65000"/>
+                                <a:lumOff val="35000"/>
+                              </a:schemeClr>
+                            </a:solidFill>
+                            <a:latin typeface="Cambria Math" panose="02040503050406030204" pitchFamily="18" charset="0"/>
+                          </a:rPr>
+                        </m:ctrlPr>
+                      </m:sSupPr>
+                      <m:e>
+                        <m:r>
+                          <a:rPr lang="en-US" sz="2600" b="0" i="1" smtClean="0">
+                            <a:solidFill>
+                              <a:schemeClr val="tx1">
+                                <a:lumMod val="65000"/>
+                                <a:lumOff val="35000"/>
+                              </a:schemeClr>
+                            </a:solidFill>
+                            <a:latin typeface="Cambria Math" panose="02040503050406030204" pitchFamily="18" charset="0"/>
+                          </a:rPr>
+                          <m:t>𝑔</m:t>
+                        </m:r>
+                      </m:e>
+                      <m:sup>
+                        <m:r>
+                          <a:rPr lang="en-US" sz="2600" b="0" i="1" smtClean="0">
+                            <a:solidFill>
+                              <a:schemeClr val="tx1">
+                                <a:lumMod val="65000"/>
+                                <a:lumOff val="35000"/>
+                              </a:schemeClr>
+                            </a:solidFill>
+                            <a:latin typeface="Cambria Math" panose="02040503050406030204" pitchFamily="18" charset="0"/>
+                          </a:rPr>
+                          <m:t>2</m:t>
+                        </m:r>
+                      </m:sup>
+                    </m:sSup>
+                    <m:r>
+                      <a:rPr lang="en-US" sz="2600" b="0" i="1" smtClean="0">
+                        <a:solidFill>
+                          <a:schemeClr val="tx1">
+                            <a:lumMod val="65000"/>
+                            <a:lumOff val="35000"/>
+                          </a:schemeClr>
+                        </a:solidFill>
+                        <a:latin typeface="Cambria Math" panose="02040503050406030204" pitchFamily="18" charset="0"/>
+                        <a:ea typeface="Cambria Math" panose="02040503050406030204" pitchFamily="18" charset="0"/>
+                      </a:rPr>
+                      <m:t>≈0.</m:t>
+                    </m:r>
+                  </m:oMath>
+                </a14:m>
+                <a:endParaRPr lang="en-US" sz="2600" b="0" dirty="0">
+                  <a:solidFill>
+                    <a:schemeClr val="tx1">
+                      <a:lumMod val="65000"/>
+                      <a:lumOff val="35000"/>
+                    </a:schemeClr>
+                  </a:solidFill>
+                  <a:latin typeface="Montserrat" panose="00000500000000000000" pitchFamily="2" charset="0"/>
+                  <a:ea typeface="Cambria Math" panose="02040503050406030204" pitchFamily="18" charset="0"/>
+                </a:endParaRPr>
               </a:p>
               <a:p>
                 <a:r>
-                  <a:rPr lang="bg-BG" dirty="0"/>
+                  <a:rPr lang="bg-BG" sz="2600" dirty="0">
+                    <a:solidFill>
+                      <a:schemeClr val="tx1">
+                        <a:lumMod val="65000"/>
+                        <a:lumOff val="35000"/>
+                      </a:schemeClr>
+                    </a:solidFill>
+                    <a:latin typeface="Montserrat" panose="00000500000000000000" pitchFamily="2" charset="0"/>
+                  </a:rPr>
                   <a:t>Трябва да намерим за кои </a:t>
                 </a:r>
                 <a14:m>
@@ -5593,14 +7350,26 @@
                     <m:sSub>
                       <m:sSubPr>
                         <m:ctrlPr>
-                          <a:rPr lang="en-US" i="1">
+                          <a:rPr lang="en-US" sz="2600" i="1">
+                            <a:solidFill>
+                              <a:schemeClr val="tx1">
+                                <a:lumMod val="65000"/>
+                                <a:lumOff val="35000"/>
+                              </a:schemeClr>
+                            </a:solidFill>
                             <a:latin typeface="Cambria Math" panose="02040503050406030204" pitchFamily="18" charset="0"/>
                           </a:rPr>
                         </m:ctrlPr>
                       </m:sSubPr>
                       <m:e>
                         <m:r>
-                          <a:rPr lang="en-US" b="0" i="1" smtClean="0">
+                          <a:rPr lang="en-US" sz="2600" b="0" i="1" smtClean="0">
+                            <a:solidFill>
+                              <a:schemeClr val="tx1">
+                                <a:lumMod val="65000"/>
+                                <a:lumOff val="35000"/>
+                              </a:schemeClr>
+                            </a:solidFill>
                             <a:latin typeface="Cambria Math" panose="02040503050406030204" pitchFamily="18" charset="0"/>
                           </a:rPr>
                           <m:t>𝑀</m:t>
@@ -5608,13 +7377,25 @@
                       </m:e>
                       <m:sub>
                         <m:r>
-                          <a:rPr lang="en-US" b="0" i="1" smtClean="0">
+                          <a:rPr lang="en-US" sz="2600" b="0" i="1" smtClean="0">
+                            <a:solidFill>
+                              <a:schemeClr val="tx1">
+                                <a:lumMod val="65000"/>
+                                <a:lumOff val="35000"/>
+                              </a:schemeClr>
+                            </a:solidFill>
                             <a:latin typeface="Cambria Math" panose="02040503050406030204" pitchFamily="18" charset="0"/>
                           </a:rPr>
                           <m:t>𝑥</m:t>
                         </m:r>
                         <m:r>
-                          <a:rPr lang="en-US" i="1">
+                          <a:rPr lang="en-US" sz="2600" i="1">
+                            <a:solidFill>
+                              <a:schemeClr val="tx1">
+                                <a:lumMod val="65000"/>
+                                <a:lumOff val="35000"/>
+                              </a:schemeClr>
+                            </a:solidFill>
                             <a:latin typeface="Cambria Math" panose="02040503050406030204" pitchFamily="18" charset="0"/>
                           </a:rPr>
                           <m:t>𝑥</m:t>
@@ -5622,7 +7403,13 @@
                       </m:sub>
                     </m:sSub>
                     <m:r>
-                      <a:rPr lang="en-US" b="0" i="1" smtClean="0">
+                      <a:rPr lang="en-US" sz="2600" b="0" i="1" smtClean="0">
+                        <a:solidFill>
+                          <a:schemeClr val="tx1">
+                            <a:lumMod val="65000"/>
+                            <a:lumOff val="35000"/>
+                          </a:schemeClr>
+                        </a:solidFill>
                         <a:latin typeface="Cambria Math" panose="02040503050406030204" pitchFamily="18" charset="0"/>
                       </a:rPr>
                       <m:t>−</m:t>
@@ -5630,14 +7417,26 @@
                     <m:sSub>
                       <m:sSubPr>
                         <m:ctrlPr>
-                          <a:rPr lang="en-US" i="1">
+                          <a:rPr lang="en-US" sz="2600" i="1">
+                            <a:solidFill>
+                              <a:schemeClr val="tx1">
+                                <a:lumMod val="65000"/>
+                                <a:lumOff val="35000"/>
+                              </a:schemeClr>
+                            </a:solidFill>
                             <a:latin typeface="Cambria Math" panose="02040503050406030204" pitchFamily="18" charset="0"/>
                           </a:rPr>
                         </m:ctrlPr>
                       </m:sSubPr>
                       <m:e>
                         <m:r>
-                          <a:rPr lang="en-US" b="0" i="1" smtClean="0">
+                          <a:rPr lang="en-US" sz="2600" b="0" i="1" smtClean="0">
+                            <a:solidFill>
+                              <a:schemeClr val="tx1">
+                                <a:lumMod val="65000"/>
+                                <a:lumOff val="35000"/>
+                              </a:schemeClr>
+                            </a:solidFill>
                             <a:latin typeface="Cambria Math" panose="02040503050406030204" pitchFamily="18" charset="0"/>
                           </a:rPr>
                           <m:t>𝑀</m:t>
@@ -5645,7 +7444,13 @@
                       </m:e>
                       <m:sub>
                         <m:r>
-                          <a:rPr lang="en-US" b="0" i="1" smtClean="0">
+                          <a:rPr lang="en-US" sz="2600" b="0" i="1" smtClean="0">
+                            <a:solidFill>
+                              <a:schemeClr val="tx1">
+                                <a:lumMod val="65000"/>
+                                <a:lumOff val="35000"/>
+                              </a:schemeClr>
+                            </a:solidFill>
                             <a:latin typeface="Cambria Math" panose="02040503050406030204" pitchFamily="18" charset="0"/>
                           </a:rPr>
                           <m:t>𝑧𝑧</m:t>
@@ -5655,22 +7460,42 @@
                   </m:oMath>
                 </a14:m>
                 <a:r>
-                  <a:rPr lang="bg-BG" dirty="0"/>
-                  <a:t>и </a:t>
+                  <a:rPr lang="bg-BG" sz="2600" dirty="0">
+                    <a:solidFill>
+                      <a:schemeClr val="tx1">
+                        <a:lumMod val="65000"/>
+                        <a:lumOff val="35000"/>
+                      </a:schemeClr>
+                    </a:solidFill>
+                    <a:latin typeface="Montserrat" panose="00000500000000000000" pitchFamily="2" charset="0"/>
+                  </a:rPr>
+                  <a:t> и </a:t>
                 </a:r>
                 <a14:m>
                   <m:oMath xmlns:m="http://schemas.openxmlformats.org/officeDocument/2006/math">
                     <m:sSub>
                       <m:sSubPr>
                         <m:ctrlPr>
-                          <a:rPr lang="en-US" i="1">
+                          <a:rPr lang="en-US" sz="2600" i="1">
+                            <a:solidFill>
+                              <a:schemeClr val="tx1">
+                                <a:lumMod val="65000"/>
+                                <a:lumOff val="35000"/>
+                              </a:schemeClr>
+                            </a:solidFill>
                             <a:latin typeface="Cambria Math" panose="02040503050406030204" pitchFamily="18" charset="0"/>
                           </a:rPr>
                         </m:ctrlPr>
                       </m:sSubPr>
                       <m:e>
                         <m:r>
-                          <a:rPr lang="en-US" i="1">
+                          <a:rPr lang="en-US" sz="2600" i="1">
+                            <a:solidFill>
+                              <a:schemeClr val="tx1">
+                                <a:lumMod val="65000"/>
+                                <a:lumOff val="35000"/>
+                              </a:schemeClr>
+                            </a:solidFill>
                             <a:latin typeface="Cambria Math" panose="02040503050406030204" pitchFamily="18" charset="0"/>
                           </a:rPr>
                           <m:t>𝐵</m:t>
@@ -5678,7 +7503,13 @@
                       </m:e>
                       <m:sub>
                         <m:r>
-                          <a:rPr lang="en-US" i="1">
+                          <a:rPr lang="en-US" sz="2600" i="1">
+                            <a:solidFill>
+                              <a:schemeClr val="tx1">
+                                <a:lumMod val="65000"/>
+                                <a:lumOff val="35000"/>
+                              </a:schemeClr>
+                            </a:solidFill>
                             <a:latin typeface="Cambria Math" panose="02040503050406030204" pitchFamily="18" charset="0"/>
                           </a:rPr>
                           <m:t>𝑥</m:t>
@@ -5688,11 +7519,27 @@
                   </m:oMath>
                 </a14:m>
                 <a:r>
-                  <a:rPr lang="bg-BG" dirty="0"/>
+                  <a:rPr lang="bg-BG" sz="2600" dirty="0">
+                    <a:solidFill>
+                      <a:schemeClr val="tx1">
+                        <a:lumMod val="65000"/>
+                        <a:lumOff val="35000"/>
+                      </a:schemeClr>
+                    </a:solidFill>
+                    <a:latin typeface="Montserrat" panose="00000500000000000000" pitchFamily="2" charset="0"/>
+                  </a:rPr>
                   <a:t>-</a:t>
                 </a:r>
                 <a:r>
-                  <a:rPr lang="en-US" dirty="0"/>
+                  <a:rPr lang="en-US" sz="2600" dirty="0">
+                    <a:solidFill>
+                      <a:schemeClr val="tx1">
+                        <a:lumMod val="65000"/>
+                        <a:lumOff val="35000"/>
+                      </a:schemeClr>
+                    </a:solidFill>
+                    <a:latin typeface="Montserrat" panose="00000500000000000000" pitchFamily="2" charset="0"/>
+                  </a:rPr>
                   <a:t> </a:t>
                 </a:r>
                 <a14:m>
@@ -5700,14 +7547,26 @@
                     <m:sSub>
                       <m:sSubPr>
                         <m:ctrlPr>
-                          <a:rPr lang="en-US" i="1">
+                          <a:rPr lang="en-US" sz="2600" i="1">
+                            <a:solidFill>
+                              <a:schemeClr val="tx1">
+                                <a:lumMod val="65000"/>
+                                <a:lumOff val="35000"/>
+                              </a:schemeClr>
+                            </a:solidFill>
                             <a:latin typeface="Cambria Math" panose="02040503050406030204" pitchFamily="18" charset="0"/>
                           </a:rPr>
                         </m:ctrlPr>
                       </m:sSubPr>
                       <m:e>
                         <m:r>
-                          <a:rPr lang="en-US" i="1">
+                          <a:rPr lang="en-US" sz="2600" i="1">
+                            <a:solidFill>
+                              <a:schemeClr val="tx1">
+                                <a:lumMod val="65000"/>
+                                <a:lumOff val="35000"/>
+                              </a:schemeClr>
+                            </a:solidFill>
                             <a:latin typeface="Cambria Math" panose="02040503050406030204" pitchFamily="18" charset="0"/>
                           </a:rPr>
                           <m:t>𝐵</m:t>
@@ -5715,7 +7574,13 @@
                       </m:e>
                       <m:sub>
                         <m:r>
-                          <a:rPr lang="en-US" b="0" i="1" smtClean="0">
+                          <a:rPr lang="en-US" sz="2600" b="0" i="1" smtClean="0">
+                            <a:solidFill>
+                              <a:schemeClr val="tx1">
+                                <a:lumMod val="65000"/>
+                                <a:lumOff val="35000"/>
+                              </a:schemeClr>
+                            </a:solidFill>
                             <a:latin typeface="Cambria Math" panose="02040503050406030204" pitchFamily="18" charset="0"/>
                           </a:rPr>
                           <m:t>𝑧</m:t>
@@ -5725,9 +7590,31 @@
                   </m:oMath>
                 </a14:m>
                 <a:r>
-                  <a:rPr lang="bg-BG" dirty="0"/>
+                  <a:rPr lang="bg-BG" sz="2600" dirty="0">
+                    <a:solidFill>
+                      <a:schemeClr val="tx1">
+                        <a:lumMod val="65000"/>
+                        <a:lumOff val="35000"/>
+                      </a:schemeClr>
+                    </a:solidFill>
+                    <a:latin typeface="Montserrat" panose="00000500000000000000" pitchFamily="2" charset="0"/>
+                  </a:rPr>
                   <a:t> имаме най-малка грешка. Започваме от начално приближение:</a:t>
                 </a:r>
+              </a:p>
+              <a:p>
+                <a:pPr marL="0" indent="0">
+                  <a:buNone/>
+                </a:pPr>
+                <a:endParaRPr lang="en-US" b="0" i="1" dirty="0">
+                  <a:solidFill>
+                    <a:schemeClr val="tx1">
+                      <a:lumMod val="65000"/>
+                      <a:lumOff val="35000"/>
+                    </a:schemeClr>
+                  </a:solidFill>
+                  <a:latin typeface="Cambria Math" panose="02040503050406030204" pitchFamily="18" charset="0"/>
+                </a:endParaRPr>
               </a:p>
               <a:p>
                 <a:pPr marL="0" indent="0">
@@ -5741,12 +7628,24 @@
                     <m:oMath xmlns:m="http://schemas.openxmlformats.org/officeDocument/2006/math">
                       <m:r>
                         <a:rPr lang="en-US" b="0" i="1" smtClean="0">
+                          <a:solidFill>
+                            <a:schemeClr val="tx1">
+                              <a:lumMod val="65000"/>
+                              <a:lumOff val="35000"/>
+                            </a:schemeClr>
+                          </a:solidFill>
                           <a:latin typeface="Cambria Math" panose="02040503050406030204" pitchFamily="18" charset="0"/>
                         </a:rPr>
                         <m:t>𝑀</m:t>
                       </m:r>
                       <m:r>
                         <a:rPr lang="en-US" b="0" i="1" smtClean="0">
+                          <a:solidFill>
+                            <a:schemeClr val="tx1">
+                              <a:lumMod val="65000"/>
+                              <a:lumOff val="35000"/>
+                            </a:schemeClr>
+                          </a:solidFill>
                           <a:latin typeface="Cambria Math" panose="02040503050406030204" pitchFamily="18" charset="0"/>
                         </a:rPr>
                         <m:t>=</m:t>
@@ -5755,6 +7654,12 @@
                         <m:dPr>
                           <m:ctrlPr>
                             <a:rPr lang="en-US" i="1">
+                              <a:solidFill>
+                                <a:schemeClr val="tx1">
+                                  <a:lumMod val="65000"/>
+                                  <a:lumOff val="35000"/>
+                                </a:schemeClr>
+                              </a:solidFill>
                               <a:latin typeface="Cambria Math" panose="02040503050406030204" pitchFamily="18" charset="0"/>
                             </a:rPr>
                           </m:ctrlPr>
@@ -5772,6 +7677,12 @@
                               </m:mcs>
                               <m:ctrlPr>
                                 <a:rPr lang="en-US" i="1">
+                                  <a:solidFill>
+                                    <a:schemeClr val="tx1">
+                                      <a:lumMod val="65000"/>
+                                      <a:lumOff val="35000"/>
+                                    </a:schemeClr>
+                                  </a:solidFill>
                                   <a:latin typeface="Cambria Math" panose="02040503050406030204" pitchFamily="18" charset="0"/>
                                 </a:rPr>
                               </m:ctrlPr>
@@ -5780,6 +7691,12 @@
                               <m:e>
                                 <m:r>
                                   <a:rPr lang="bg-BG" b="0" i="1" smtClean="0">
+                                    <a:solidFill>
+                                      <a:schemeClr val="tx1">
+                                        <a:lumMod val="65000"/>
+                                        <a:lumOff val="35000"/>
+                                      </a:schemeClr>
+                                    </a:solidFill>
                                     <a:latin typeface="Cambria Math" panose="02040503050406030204" pitchFamily="18" charset="0"/>
                                   </a:rPr>
                                   <m:t>1</m:t>
@@ -5788,6 +7705,12 @@
                               <m:e>
                                 <m:r>
                                   <a:rPr lang="bg-BG" b="0" i="1" smtClean="0">
+                                    <a:solidFill>
+                                      <a:schemeClr val="tx1">
+                                        <a:lumMod val="65000"/>
+                                        <a:lumOff val="35000"/>
+                                      </a:schemeClr>
+                                    </a:solidFill>
                                     <a:latin typeface="Cambria Math" panose="02040503050406030204" pitchFamily="18" charset="0"/>
                                   </a:rPr>
                                   <m:t>0</m:t>
@@ -5796,6 +7719,12 @@
                               <m:e>
                                 <m:r>
                                   <a:rPr lang="bg-BG" b="0" i="1" smtClean="0">
+                                    <a:solidFill>
+                                      <a:schemeClr val="tx1">
+                                        <a:lumMod val="65000"/>
+                                        <a:lumOff val="35000"/>
+                                      </a:schemeClr>
+                                    </a:solidFill>
                                     <a:latin typeface="Cambria Math" panose="02040503050406030204" pitchFamily="18" charset="0"/>
                                   </a:rPr>
                                   <m:t>0</m:t>
@@ -5806,6 +7735,12 @@
                               <m:e>
                                 <m:r>
                                   <a:rPr lang="bg-BG" b="0" i="1" smtClean="0">
+                                    <a:solidFill>
+                                      <a:schemeClr val="tx1">
+                                        <a:lumMod val="65000"/>
+                                        <a:lumOff val="35000"/>
+                                      </a:schemeClr>
+                                    </a:solidFill>
                                     <a:latin typeface="Cambria Math" panose="02040503050406030204" pitchFamily="18" charset="0"/>
                                   </a:rPr>
                                   <m:t>0</m:t>
@@ -5814,6 +7749,12 @@
                               <m:e>
                                 <m:r>
                                   <a:rPr lang="bg-BG" b="0" i="1" smtClean="0">
+                                    <a:solidFill>
+                                      <a:schemeClr val="tx1">
+                                        <a:lumMod val="65000"/>
+                                        <a:lumOff val="35000"/>
+                                      </a:schemeClr>
+                                    </a:solidFill>
                                     <a:latin typeface="Cambria Math" panose="02040503050406030204" pitchFamily="18" charset="0"/>
                                   </a:rPr>
                                   <m:t>1</m:t>
@@ -5822,6 +7763,12 @@
                               <m:e>
                                 <m:r>
                                   <a:rPr lang="bg-BG" b="0" i="1" smtClean="0">
+                                    <a:solidFill>
+                                      <a:schemeClr val="tx1">
+                                        <a:lumMod val="65000"/>
+                                        <a:lumOff val="35000"/>
+                                      </a:schemeClr>
+                                    </a:solidFill>
                                     <a:latin typeface="Cambria Math" panose="02040503050406030204" pitchFamily="18" charset="0"/>
                                   </a:rPr>
                                   <m:t>0</m:t>
@@ -5832,6 +7779,12 @@
                               <m:e>
                                 <m:r>
                                   <a:rPr lang="bg-BG" b="0" i="1" smtClean="0">
+                                    <a:solidFill>
+                                      <a:schemeClr val="tx1">
+                                        <a:lumMod val="65000"/>
+                                        <a:lumOff val="35000"/>
+                                      </a:schemeClr>
+                                    </a:solidFill>
                                     <a:latin typeface="Cambria Math" panose="02040503050406030204" pitchFamily="18" charset="0"/>
                                   </a:rPr>
                                   <m:t>0</m:t>
@@ -5840,6 +7793,12 @@
                               <m:e>
                                 <m:r>
                                   <a:rPr lang="bg-BG" b="0" i="1" smtClean="0">
+                                    <a:solidFill>
+                                      <a:schemeClr val="tx1">
+                                        <a:lumMod val="65000"/>
+                                        <a:lumOff val="35000"/>
+                                      </a:schemeClr>
+                                    </a:solidFill>
                                     <a:latin typeface="Cambria Math" panose="02040503050406030204" pitchFamily="18" charset="0"/>
                                   </a:rPr>
                                   <m:t>0</m:t>
@@ -5848,6 +7807,12 @@
                               <m:e>
                                 <m:r>
                                   <a:rPr lang="bg-BG" b="0" i="1" smtClean="0">
+                                    <a:solidFill>
+                                      <a:schemeClr val="tx1">
+                                        <a:lumMod val="65000"/>
+                                        <a:lumOff val="35000"/>
+                                      </a:schemeClr>
+                                    </a:solidFill>
                                     <a:latin typeface="Cambria Math" panose="02040503050406030204" pitchFamily="18" charset="0"/>
                                   </a:rPr>
                                   <m:t>1</m:t>
@@ -5859,30 +7824,60 @@
                       </m:d>
                       <m:r>
                         <a:rPr lang="en-US" b="0" i="1" smtClean="0">
+                          <a:solidFill>
+                            <a:schemeClr val="tx1">
+                              <a:lumMod val="65000"/>
+                              <a:lumOff val="35000"/>
+                            </a:schemeClr>
+                          </a:solidFill>
                           <a:latin typeface="Cambria Math" panose="02040503050406030204" pitchFamily="18" charset="0"/>
                         </a:rPr>
                         <m:t>,</m:t>
                       </m:r>
                       <m:r>
                         <a:rPr lang="bg-BG" b="0" i="1" smtClean="0">
+                          <a:solidFill>
+                            <a:schemeClr val="tx1">
+                              <a:lumMod val="65000"/>
+                              <a:lumOff val="35000"/>
+                            </a:schemeClr>
+                          </a:solidFill>
                           <a:latin typeface="Cambria Math" panose="02040503050406030204" pitchFamily="18" charset="0"/>
                         </a:rPr>
                         <m:t> </m:t>
                       </m:r>
                       <m:r>
                         <a:rPr lang="en-US" b="0" i="1" smtClean="0">
+                          <a:solidFill>
+                            <a:schemeClr val="tx1">
+                              <a:lumMod val="65000"/>
+                              <a:lumOff val="35000"/>
+                            </a:schemeClr>
+                          </a:solidFill>
                           <a:latin typeface="Cambria Math" panose="02040503050406030204" pitchFamily="18" charset="0"/>
                         </a:rPr>
                         <m:t> </m:t>
                       </m:r>
                       <m:r>
                         <a:rPr lang="en-US" b="0" i="1" smtClean="0">
+                          <a:solidFill>
+                            <a:schemeClr val="tx1">
+                              <a:lumMod val="65000"/>
+                              <a:lumOff val="35000"/>
+                            </a:schemeClr>
+                          </a:solidFill>
                           <a:latin typeface="Cambria Math" panose="02040503050406030204" pitchFamily="18" charset="0"/>
                         </a:rPr>
                         <m:t>𝐵</m:t>
                       </m:r>
                       <m:r>
                         <a:rPr lang="en-US" b="0" i="1" smtClean="0">
+                          <a:solidFill>
+                            <a:schemeClr val="tx1">
+                              <a:lumMod val="65000"/>
+                              <a:lumOff val="35000"/>
+                            </a:schemeClr>
+                          </a:solidFill>
                           <a:latin typeface="Cambria Math" panose="02040503050406030204" pitchFamily="18" charset="0"/>
                         </a:rPr>
                         <m:t>=</m:t>
@@ -5891,6 +7886,12 @@
                         <m:dPr>
                           <m:ctrlPr>
                             <a:rPr lang="en-US" i="1">
+                              <a:solidFill>
+                                <a:schemeClr val="tx1">
+                                  <a:lumMod val="65000"/>
+                                  <a:lumOff val="35000"/>
+                                </a:schemeClr>
+                              </a:solidFill>
                               <a:latin typeface="Cambria Math" panose="02040503050406030204" pitchFamily="18" charset="0"/>
                             </a:rPr>
                           </m:ctrlPr>
@@ -5908,6 +7909,12 @@
                               </m:mcs>
                               <m:ctrlPr>
                                 <a:rPr lang="en-US" i="1" smtClean="0">
+                                  <a:solidFill>
+                                    <a:schemeClr val="tx1">
+                                      <a:lumMod val="65000"/>
+                                      <a:lumOff val="35000"/>
+                                    </a:schemeClr>
+                                  </a:solidFill>
                                   <a:latin typeface="Cambria Math" panose="02040503050406030204" pitchFamily="18" charset="0"/>
                                 </a:rPr>
                               </m:ctrlPr>
@@ -5916,6 +7923,12 @@
                               <m:e>
                                 <m:r>
                                   <a:rPr lang="en-US" b="0" i="1" smtClean="0">
+                                    <a:solidFill>
+                                      <a:schemeClr val="tx1">
+                                        <a:lumMod val="65000"/>
+                                        <a:lumOff val="35000"/>
+                                      </a:schemeClr>
+                                    </a:solidFill>
                                     <a:latin typeface="Cambria Math" panose="02040503050406030204" pitchFamily="18" charset="0"/>
                                   </a:rPr>
                                   <m:t>0</m:t>
@@ -5926,6 +7939,12 @@
                               <m:e>
                                 <m:r>
                                   <a:rPr lang="en-US" b="0" i="1" smtClean="0">
+                                    <a:solidFill>
+                                      <a:schemeClr val="tx1">
+                                        <a:lumMod val="65000"/>
+                                        <a:lumOff val="35000"/>
+                                      </a:schemeClr>
+                                    </a:solidFill>
                                     <a:latin typeface="Cambria Math" panose="02040503050406030204" pitchFamily="18" charset="0"/>
                                   </a:rPr>
                                   <m:t>0</m:t>
@@ -5936,6 +7955,12 @@
                               <m:e>
                                 <m:r>
                                   <a:rPr lang="en-US" b="0" i="1" smtClean="0">
+                                    <a:solidFill>
+                                      <a:schemeClr val="tx1">
+                                        <a:lumMod val="65000"/>
+                                        <a:lumOff val="35000"/>
+                                      </a:schemeClr>
+                                    </a:solidFill>
                                     <a:latin typeface="Cambria Math" panose="02040503050406030204" pitchFamily="18" charset="0"/>
                                   </a:rPr>
                                   <m:t>0</m:t>
@@ -5949,18 +7974,50 @@
                   </m:oMathPara>
                 </a14:m>
                 <a:br>
-                  <a:rPr lang="bg-BG" dirty="0"/>
+                  <a:rPr lang="bg-BG" dirty="0">
+                    <a:solidFill>
+                      <a:schemeClr val="tx1">
+                        <a:lumMod val="65000"/>
+                        <a:lumOff val="35000"/>
+                      </a:schemeClr>
+                    </a:solidFill>
+                    <a:latin typeface="Montserrat" panose="00000500000000000000" pitchFamily="2" charset="0"/>
+                  </a:rPr>
                 </a:br>
-                <a:endParaRPr lang="en-US" dirty="0"/>
+                <a:endParaRPr lang="en-US" dirty="0">
+                  <a:solidFill>
+                    <a:schemeClr val="tx1">
+                      <a:lumMod val="65000"/>
+                      <a:lumOff val="35000"/>
+                    </a:schemeClr>
+                  </a:solidFill>
+                  <a:latin typeface="Montserrat" panose="00000500000000000000" pitchFamily="2" charset="0"/>
+                </a:endParaRPr>
               </a:p>
               <a:p>
                 <a:pPr marL="0" indent="0">
                   <a:buNone/>
                 </a:pPr>
-                <a:endParaRPr lang="bg-BG" dirty="0"/>
+                <a:endParaRPr lang="bg-BG" dirty="0">
+                  <a:solidFill>
+                    <a:schemeClr val="tx1">
+                      <a:lumMod val="65000"/>
+                      <a:lumOff val="35000"/>
+                    </a:schemeClr>
+                  </a:solidFill>
+                  <a:latin typeface="Montserrat" panose="00000500000000000000" pitchFamily="2" charset="0"/>
+                </a:endParaRPr>
               </a:p>
               <a:p>
-                <a:endParaRPr lang="en-US" b="1" dirty="0"/>
+                <a:endParaRPr lang="en-US" b="1" dirty="0">
+                  <a:solidFill>
+                    <a:schemeClr val="tx1">
+                      <a:lumMod val="65000"/>
+                      <a:lumOff val="35000"/>
+                    </a:schemeClr>
+                  </a:solidFill>
+                  <a:latin typeface="Montserrat" panose="00000500000000000000" pitchFamily="2" charset="0"/>
+                </a:endParaRPr>
               </a:p>
             </p:txBody>
           </p:sp>
@@ -5988,9 +8045,9 @@
                 <a:ext cx="11858624" cy="4351338"/>
               </a:xfrm>
               <a:blipFill>
-                <a:blip r:embed="rId2"/>
+                <a:blip r:embed="rId3"/>
                 <a:stretch>
-                  <a:fillRect l="-925" t="-140"/>
+                  <a:fillRect l="-720"/>
                 </a:stretch>
               </a:blipFill>
             </p:spPr>
@@ -6062,44 +8119,325 @@
           <a:p>
             <a:r>
               <a:rPr lang="bg-BG" dirty="0">
-                <a:latin typeface="Montserrat SemiBold" panose="00000700000000000000" pitchFamily="2" charset="0"/>
+                <a:solidFill>
+                  <a:srgbClr val="FFA161"/>
+                </a:solidFill>
+                <a:latin typeface="Montserrat Black" panose="00000A00000000000000" pitchFamily="2" charset="0"/>
               </a:rPr>
               <a:t>Първоначално решение </a:t>
             </a:r>
             <a:br>
               <a:rPr lang="bg-BG" dirty="0">
-                <a:latin typeface="Montserrat SemiBold" panose="00000700000000000000" pitchFamily="2" charset="0"/>
+                <a:solidFill>
+                  <a:srgbClr val="FFA161"/>
+                </a:solidFill>
+                <a:latin typeface="Montserrat Black" panose="00000A00000000000000" pitchFamily="2" charset="0"/>
               </a:rPr>
             </a:br>
-            <a:endParaRPr lang="en-US" dirty="0"/>
-          </a:p>
-        </p:txBody>
-      </p:sp>
-      <p:sp>
-        <p:nvSpPr>
-          <p:cNvPr id="3" name="Content Placeholder 2">
+            <a:endParaRPr lang="en-US" dirty="0">
+              <a:solidFill>
+                <a:srgbClr val="FFA161"/>
+              </a:solidFill>
+              <a:latin typeface="Montserrat Black" panose="00000A00000000000000" pitchFamily="2" charset="0"/>
+            </a:endParaRPr>
+          </a:p>
+        </p:txBody>
+      </p:sp>
+      <mc:AlternateContent xmlns:mc="http://schemas.openxmlformats.org/markup-compatibility/2006">
+        <mc:Choice xmlns:a14="http://schemas.microsoft.com/office/drawing/2010/main" Requires="a14">
+          <p:sp>
+            <p:nvSpPr>
+              <p:cNvPr id="6" name="TextBox 5">
+                <a:extLst>
+                  <a:ext uri="{FF2B5EF4-FFF2-40B4-BE49-F238E27FC236}">
+                    <a16:creationId xmlns:a16="http://schemas.microsoft.com/office/drawing/2014/main" id="{1F7D4B13-5380-4FF6-AF18-F150FBAA61DE}"/>
+                  </a:ext>
+                </a:extLst>
+              </p:cNvPr>
+              <p:cNvSpPr txBox="1"/>
+              <p:nvPr/>
+            </p:nvSpPr>
+            <p:spPr>
+              <a:xfrm>
+                <a:off x="923925" y="1390650"/>
+                <a:ext cx="10325100" cy="954107"/>
+              </a:xfrm>
+              <a:prstGeom prst="rect">
+                <a:avLst/>
+              </a:prstGeom>
+              <a:noFill/>
+            </p:spPr>
+            <p:txBody>
+              <a:bodyPr wrap="square" rtlCol="0">
+                <a:spAutoFit/>
+              </a:bodyPr>
+              <a:lstStyle/>
+              <a:p>
+                <a:r>
+                  <a:rPr lang="bg-BG" sz="2800" dirty="0"/>
+                  <a:t>Използвам метода на най-малките квадрати да намеря за кои </a:t>
+                </a:r>
+                <a14:m>
+                  <m:oMath xmlns:m="http://schemas.openxmlformats.org/officeDocument/2006/math">
+                    <m:sSub>
+                      <m:sSubPr>
+                        <m:ctrlPr>
+                          <a:rPr lang="en-US" sz="2800" i="1">
+                            <a:latin typeface="Cambria Math" panose="02040503050406030204" pitchFamily="18" charset="0"/>
+                          </a:rPr>
+                        </m:ctrlPr>
+                      </m:sSubPr>
+                      <m:e>
+                        <m:r>
+                          <a:rPr lang="en-US" sz="2800" i="1">
+                            <a:latin typeface="Cambria Math" panose="02040503050406030204" pitchFamily="18" charset="0"/>
+                          </a:rPr>
+                          <m:t>𝑀</m:t>
+                        </m:r>
+                      </m:e>
+                      <m:sub>
+                        <m:r>
+                          <a:rPr lang="en-US" sz="2800" i="1">
+                            <a:latin typeface="Cambria Math" panose="02040503050406030204" pitchFamily="18" charset="0"/>
+                          </a:rPr>
+                          <m:t>𝑥</m:t>
+                        </m:r>
+                        <m:r>
+                          <a:rPr lang="en-US" sz="2800" i="1">
+                            <a:latin typeface="Cambria Math" panose="02040503050406030204" pitchFamily="18" charset="0"/>
+                          </a:rPr>
+                          <m:t>𝑥</m:t>
+                        </m:r>
+                      </m:sub>
+                    </m:sSub>
+                    <m:r>
+                      <a:rPr lang="en-US" sz="2800" i="1">
+                        <a:latin typeface="Cambria Math" panose="02040503050406030204" pitchFamily="18" charset="0"/>
+                      </a:rPr>
+                      <m:t>−</m:t>
+                    </m:r>
+                    <m:sSub>
+                      <m:sSubPr>
+                        <m:ctrlPr>
+                          <a:rPr lang="en-US" sz="2800" i="1">
+                            <a:latin typeface="Cambria Math" panose="02040503050406030204" pitchFamily="18" charset="0"/>
+                          </a:rPr>
+                        </m:ctrlPr>
+                      </m:sSubPr>
+                      <m:e>
+                        <m:r>
+                          <a:rPr lang="en-US" sz="2800" i="1">
+                            <a:latin typeface="Cambria Math" panose="02040503050406030204" pitchFamily="18" charset="0"/>
+                          </a:rPr>
+                          <m:t>𝑀</m:t>
+                        </m:r>
+                      </m:e>
+                      <m:sub>
+                        <m:r>
+                          <a:rPr lang="en-US" sz="2800" i="1">
+                            <a:latin typeface="Cambria Math" panose="02040503050406030204" pitchFamily="18" charset="0"/>
+                          </a:rPr>
+                          <m:t>𝑧𝑧</m:t>
+                        </m:r>
+                      </m:sub>
+                    </m:sSub>
+                  </m:oMath>
+                </a14:m>
+                <a:r>
+                  <a:rPr lang="bg-BG" sz="2800" dirty="0"/>
+                  <a:t>и </a:t>
+                </a:r>
+                <a14:m>
+                  <m:oMath xmlns:m="http://schemas.openxmlformats.org/officeDocument/2006/math">
+                    <m:sSub>
+                      <m:sSubPr>
+                        <m:ctrlPr>
+                          <a:rPr lang="en-US" sz="2800" i="1">
+                            <a:latin typeface="Cambria Math" panose="02040503050406030204" pitchFamily="18" charset="0"/>
+                          </a:rPr>
+                        </m:ctrlPr>
+                      </m:sSubPr>
+                      <m:e>
+                        <m:r>
+                          <a:rPr lang="en-US" sz="2800" i="1">
+                            <a:latin typeface="Cambria Math" panose="02040503050406030204" pitchFamily="18" charset="0"/>
+                          </a:rPr>
+                          <m:t>𝐵</m:t>
+                        </m:r>
+                      </m:e>
+                      <m:sub>
+                        <m:r>
+                          <a:rPr lang="en-US" sz="2800" i="1">
+                            <a:latin typeface="Cambria Math" panose="02040503050406030204" pitchFamily="18" charset="0"/>
+                          </a:rPr>
+                          <m:t>𝑥</m:t>
+                        </m:r>
+                      </m:sub>
+                    </m:sSub>
+                  </m:oMath>
+                </a14:m>
+                <a:r>
+                  <a:rPr lang="bg-BG" sz="2800" dirty="0"/>
+                  <a:t>-</a:t>
+                </a:r>
+                <a:r>
+                  <a:rPr lang="en-US" sz="2800" dirty="0"/>
+                  <a:t> </a:t>
+                </a:r>
+                <a14:m>
+                  <m:oMath xmlns:m="http://schemas.openxmlformats.org/officeDocument/2006/math">
+                    <m:sSub>
+                      <m:sSubPr>
+                        <m:ctrlPr>
+                          <a:rPr lang="en-US" sz="2800" i="1">
+                            <a:latin typeface="Cambria Math" panose="02040503050406030204" pitchFamily="18" charset="0"/>
+                          </a:rPr>
+                        </m:ctrlPr>
+                      </m:sSubPr>
+                      <m:e>
+                        <m:r>
+                          <a:rPr lang="en-US" sz="2800" i="1">
+                            <a:latin typeface="Cambria Math" panose="02040503050406030204" pitchFamily="18" charset="0"/>
+                          </a:rPr>
+                          <m:t>𝐵</m:t>
+                        </m:r>
+                      </m:e>
+                      <m:sub>
+                        <m:r>
+                          <a:rPr lang="en-US" sz="2800" i="1">
+                            <a:latin typeface="Cambria Math" panose="02040503050406030204" pitchFamily="18" charset="0"/>
+                          </a:rPr>
+                          <m:t>𝑧</m:t>
+                        </m:r>
+                      </m:sub>
+                    </m:sSub>
+                  </m:oMath>
+                </a14:m>
+                <a:r>
+                  <a:rPr lang="bg-BG" sz="2800" dirty="0"/>
+                  <a:t> имаме най-малка грешка  за дадени данни.</a:t>
+                </a:r>
+                <a:endParaRPr lang="en-US" sz="2800" dirty="0"/>
+              </a:p>
+            </p:txBody>
+          </p:sp>
+        </mc:Choice>
+        <mc:Fallback>
+          <p:sp>
+            <p:nvSpPr>
+              <p:cNvPr id="6" name="TextBox 5">
+                <a:extLst>
+                  <a:ext uri="{FF2B5EF4-FFF2-40B4-BE49-F238E27FC236}">
+                    <a16:creationId xmlns:a16="http://schemas.microsoft.com/office/drawing/2014/main" id="{1F7D4B13-5380-4FF6-AF18-F150FBAA61DE}"/>
+                  </a:ext>
+                </a:extLst>
+              </p:cNvPr>
+              <p:cNvSpPr txBox="1">
+                <a:spLocks noRot="1" noChangeAspect="1" noMove="1" noResize="1" noEditPoints="1" noAdjustHandles="1" noChangeArrowheads="1" noChangeShapeType="1" noTextEdit="1"/>
+              </p:cNvSpPr>
+              <p:nvPr/>
+            </p:nvSpPr>
+            <p:spPr>
+              <a:xfrm>
+                <a:off x="923925" y="1390650"/>
+                <a:ext cx="10325100" cy="954107"/>
+              </a:xfrm>
+              <a:prstGeom prst="rect">
+                <a:avLst/>
+              </a:prstGeom>
+              <a:blipFill>
+                <a:blip r:embed="rId3"/>
+                <a:stretch>
+                  <a:fillRect l="-1240" t="-5732" b="-17197"/>
+                </a:stretch>
+              </a:blipFill>
+            </p:spPr>
+            <p:txBody>
+              <a:bodyPr/>
+              <a:lstStyle/>
+              <a:p>
+                <a:r>
+                  <a:rPr lang="en-US">
+                    <a:noFill/>
+                  </a:rPr>
+                  <a:t> </a:t>
+                </a:r>
+              </a:p>
+            </p:txBody>
+          </p:sp>
+        </mc:Fallback>
+      </mc:AlternateContent>
+      <p:pic>
+        <p:nvPicPr>
+          <p:cNvPr id="12" name="Content Placeholder 11" descr="A screenshot of a cell phone&#10;&#10;Description automatically generated">
             <a:extLst>
               <a:ext uri="{FF2B5EF4-FFF2-40B4-BE49-F238E27FC236}">
-                <a16:creationId xmlns:a16="http://schemas.microsoft.com/office/drawing/2014/main" id="{AB2617AC-013C-41C5-820B-1826FA07FAB3}"/>
+                <a16:creationId xmlns:a16="http://schemas.microsoft.com/office/drawing/2014/main" id="{25CE33A7-706E-4E70-BCA8-72774471B044}"/>
               </a:ext>
             </a:extLst>
           </p:cNvPr>
-          <p:cNvSpPr>
-            <a:spLocks noGrp="1"/>
-          </p:cNvSpPr>
+          <p:cNvPicPr>
+            <a:picLocks noGrp="1" noChangeAspect="1"/>
+          </p:cNvPicPr>
           <p:nvPr>
             <p:ph idx="1"/>
           </p:nvPr>
-        </p:nvSpPr>
-        <p:spPr/>
-        <p:txBody>
-          <a:bodyPr/>
-          <a:lstStyle/>
-          <a:p>
-            <a:endParaRPr lang="en-US" dirty="0"/>
-          </a:p>
-        </p:txBody>
-      </p:sp>
+        </p:nvPicPr>
+        <p:blipFill>
+          <a:blip r:embed="rId4">
+            <a:extLst>
+              <a:ext uri="{28A0092B-C50C-407E-A947-70E740481C1C}">
+                <a14:useLocalDpi xmlns:a14="http://schemas.microsoft.com/office/drawing/2010/main" val="0"/>
+              </a:ext>
+            </a:extLst>
+          </a:blip>
+          <a:stretch>
+            <a:fillRect/>
+          </a:stretch>
+        </p:blipFill>
+        <p:spPr>
+          <a:xfrm>
+            <a:off x="1790099" y="2716213"/>
+            <a:ext cx="8611802" cy="1476581"/>
+          </a:xfrm>
+        </p:spPr>
+      </p:pic>
+      <p:pic>
+        <p:nvPicPr>
+          <p:cNvPr id="16" name="Picture 15" descr="A screenshot of a cell phone&#10;&#10;Description automatically generated">
+            <a:extLst>
+              <a:ext uri="{FF2B5EF4-FFF2-40B4-BE49-F238E27FC236}">
+                <a16:creationId xmlns:a16="http://schemas.microsoft.com/office/drawing/2014/main" id="{E4E86B56-6221-4F06-96D9-140F7B19FCEB}"/>
+              </a:ext>
+            </a:extLst>
+          </p:cNvPr>
+          <p:cNvPicPr>
+            <a:picLocks noChangeAspect="1"/>
+          </p:cNvPicPr>
+          <p:nvPr/>
+        </p:nvPicPr>
+        <p:blipFill>
+          <a:blip r:embed="rId5">
+            <a:extLst>
+              <a:ext uri="{28A0092B-C50C-407E-A947-70E740481C1C}">
+                <a14:useLocalDpi xmlns:a14="http://schemas.microsoft.com/office/drawing/2010/main" val="0"/>
+              </a:ext>
+            </a:extLst>
+          </a:blip>
+          <a:stretch>
+            <a:fillRect/>
+          </a:stretch>
+        </p:blipFill>
+        <p:spPr>
+          <a:xfrm>
+            <a:off x="2752481" y="4564250"/>
+            <a:ext cx="6667988" cy="1589779"/>
+          </a:xfrm>
+          <a:prstGeom prst="rect">
+            <a:avLst/>
+          </a:prstGeom>
+        </p:spPr>
+      </p:pic>
     </p:spTree>
     <p:extLst>
       <p:ext uri="{BB962C8B-B14F-4D97-AF65-F5344CB8AC3E}">
@@ -6135,7 +8473,7 @@
           <p:cNvPr id="2" name="Title 1">
             <a:extLst>
               <a:ext uri="{FF2B5EF4-FFF2-40B4-BE49-F238E27FC236}">
-                <a16:creationId xmlns:a16="http://schemas.microsoft.com/office/drawing/2014/main" id="{4BC4D5C1-3090-4B9A-8949-FB47279DCC8D}"/>
+                <a16:creationId xmlns:a16="http://schemas.microsoft.com/office/drawing/2014/main" id="{CB27A2B1-E2C3-49A5-8CC4-8404AB9E59E9}"/>
               </a:ext>
             </a:extLst>
           </p:cNvPr>
@@ -6149,22 +8487,33 @@
         <p:spPr/>
         <p:txBody>
           <a:bodyPr>
-            <a:normAutofit fontScale="90000"/>
+            <a:normAutofit/>
           </a:bodyPr>
           <a:lstStyle/>
           <a:p>
             <a:r>
               <a:rPr lang="bg-BG" dirty="0">
-                <a:latin typeface="Montserrat SemiBold" panose="00000700000000000000" pitchFamily="2" charset="0"/>
+                <a:solidFill>
+                  <a:srgbClr val="FFA161"/>
+                </a:solidFill>
+                <a:latin typeface="Montserrat Black" panose="00000A00000000000000" pitchFamily="2" charset="0"/>
               </a:rPr>
-              <a:t>Извличане на данни от собствен сензор</a:t>
+              <a:t>Бъдещо развитие на проекта</a:t>
             </a:r>
             <a:br>
-              <a:rPr lang="bg-BG" dirty="0">
-                <a:latin typeface="Montserrat SemiBold" panose="00000700000000000000" pitchFamily="2" charset="0"/>
+              <a:rPr lang="en-US" dirty="0">
+                <a:solidFill>
+                  <a:srgbClr val="FFA161"/>
+                </a:solidFill>
+                <a:latin typeface="Montserrat Black" panose="00000A00000000000000" pitchFamily="2" charset="0"/>
               </a:rPr>
             </a:br>
-            <a:endParaRPr lang="en-US" dirty="0"/>
+            <a:endParaRPr lang="en-US" dirty="0">
+              <a:solidFill>
+                <a:srgbClr val="FFA161"/>
+              </a:solidFill>
+              <a:latin typeface="Montserrat Black" panose="00000A00000000000000" pitchFamily="2" charset="0"/>
+            </a:endParaRPr>
           </a:p>
         </p:txBody>
       </p:sp>
@@ -6173,7 +8522,7 @@
           <p:cNvPr id="3" name="Content Placeholder 2">
             <a:extLst>
               <a:ext uri="{FF2B5EF4-FFF2-40B4-BE49-F238E27FC236}">
-                <a16:creationId xmlns:a16="http://schemas.microsoft.com/office/drawing/2014/main" id="{602437FF-726F-4E5A-B55D-B2E3AE838374}"/>
+                <a16:creationId xmlns:a16="http://schemas.microsoft.com/office/drawing/2014/main" id="{53D9E26B-0A4B-4BF1-A021-04068BC6C3F0}"/>
               </a:ext>
             </a:extLst>
           </p:cNvPr>
@@ -6190,28 +8539,113 @@
           <a:lstStyle/>
           <a:p>
             <a:r>
-              <a:rPr lang="en-US" dirty="0"/>
-              <a:t>Raspberry Pi</a:t>
-            </a:r>
-          </a:p>
-          <a:p>
-            <a:r>
-              <a:rPr lang="en-US" dirty="0"/>
-              <a:t>Python</a:t>
-            </a:r>
-          </a:p>
-          <a:p>
-            <a:r>
-              <a:rPr lang="en-US" dirty="0"/>
-              <a:t>Shell script</a:t>
-            </a:r>
+              <a:rPr lang="bg-BG" dirty="0">
+                <a:solidFill>
+                  <a:schemeClr val="tx1">
+                    <a:lumMod val="65000"/>
+                    <a:lumOff val="35000"/>
+                  </a:schemeClr>
+                </a:solidFill>
+                <a:latin typeface="Montserrat" panose="00000500000000000000" pitchFamily="2" charset="0"/>
+              </a:rPr>
+              <a:t>Метода на нютон Създаване на собствена функция за минимизация.</a:t>
+            </a:r>
+          </a:p>
+          <a:p>
+            <a:pPr marL="0" indent="0">
+              <a:buNone/>
+            </a:pPr>
+            <a:endParaRPr lang="bg-BG" dirty="0">
+              <a:solidFill>
+                <a:schemeClr val="tx1">
+                  <a:lumMod val="65000"/>
+                  <a:lumOff val="35000"/>
+                </a:schemeClr>
+              </a:solidFill>
+              <a:latin typeface="Montserrat" panose="00000500000000000000" pitchFamily="2" charset="0"/>
+            </a:endParaRPr>
+          </a:p>
+          <a:p>
+            <a:r>
+              <a:rPr lang="bg-BG" dirty="0">
+                <a:solidFill>
+                  <a:schemeClr val="tx1">
+                    <a:lumMod val="65000"/>
+                    <a:lumOff val="35000"/>
+                  </a:schemeClr>
+                </a:solidFill>
+                <a:latin typeface="Montserrat" panose="00000500000000000000" pitchFamily="2" charset="0"/>
+              </a:rPr>
+              <a:t>Извличане на повече данни от собствен сензор.</a:t>
+            </a:r>
+          </a:p>
+          <a:p>
+            <a:pPr marL="0" indent="0">
+              <a:buNone/>
+            </a:pPr>
+            <a:endParaRPr lang="bg-BG" dirty="0">
+              <a:solidFill>
+                <a:schemeClr val="tx1">
+                  <a:lumMod val="65000"/>
+                  <a:lumOff val="35000"/>
+                </a:schemeClr>
+              </a:solidFill>
+              <a:latin typeface="Montserrat" panose="00000500000000000000" pitchFamily="2" charset="0"/>
+            </a:endParaRPr>
+          </a:p>
+          <a:p>
+            <a:r>
+              <a:rPr lang="bg-BG" dirty="0">
+                <a:solidFill>
+                  <a:schemeClr val="tx1">
+                    <a:lumMod val="65000"/>
+                    <a:lumOff val="35000"/>
+                  </a:schemeClr>
+                </a:solidFill>
+                <a:latin typeface="Montserrat" panose="00000500000000000000" pitchFamily="2" charset="0"/>
+              </a:rPr>
+              <a:t>Използване на сензора и алгоритъма за </a:t>
+            </a:r>
+            <a:r>
+              <a:rPr lang="bg-BG" dirty="0" err="1">
+                <a:solidFill>
+                  <a:schemeClr val="tx1">
+                    <a:lumMod val="65000"/>
+                    <a:lumOff val="35000"/>
+                  </a:schemeClr>
+                </a:solidFill>
+                <a:latin typeface="Montserrat" panose="00000500000000000000" pitchFamily="2" charset="0"/>
+              </a:rPr>
+              <a:t>калибрация</a:t>
+            </a:r>
+            <a:r>
+              <a:rPr lang="bg-BG" dirty="0">
+                <a:solidFill>
+                  <a:schemeClr val="tx1">
+                    <a:lumMod val="65000"/>
+                    <a:lumOff val="35000"/>
+                  </a:schemeClr>
+                </a:solidFill>
+                <a:latin typeface="Montserrat" panose="00000500000000000000" pitchFamily="2" charset="0"/>
+              </a:rPr>
+              <a:t> в робот.</a:t>
+            </a:r>
+            <a:endParaRPr lang="en-US" dirty="0">
+              <a:solidFill>
+                <a:schemeClr val="tx1">
+                  <a:lumMod val="65000"/>
+                  <a:lumOff val="35000"/>
+                </a:schemeClr>
+              </a:solidFill>
+              <a:latin typeface="Montserrat" panose="00000500000000000000" pitchFamily="2" charset="0"/>
+            </a:endParaRPr>
           </a:p>
         </p:txBody>
       </p:sp>
     </p:spTree>
     <p:extLst>
       <p:ext uri="{BB962C8B-B14F-4D97-AF65-F5344CB8AC3E}">
-        <p14:creationId xmlns:p14="http://schemas.microsoft.com/office/powerpoint/2010/main" val="1868462218"/>
+        <p14:creationId xmlns:p14="http://schemas.microsoft.com/office/powerpoint/2010/main" val="3871061468"/>
       </p:ext>
     </p:extLst>
   </p:cSld>

</xml_diff>

<commit_message>
Working on presentation materials.
</commit_message>
<xml_diff>
--- a/Presentation Materials/Калибриране на MEMS Акселерометри.pptx
+++ b/Presentation Materials/Калибриране на MEMS Акселерометри.pptx
@@ -10757,7 +10757,7 @@
             <p:spPr>
               <a:xfrm>
                 <a:off x="923925" y="1390650"/>
-                <a:ext cx="10325100" cy="2989280"/>
+                <a:ext cx="10325100" cy="3851054"/>
               </a:xfrm>
               <a:prstGeom prst="rect">
                 <a:avLst/>
@@ -10771,16 +10771,10 @@
               <a:lstStyle/>
               <a:p>
                 <a:r>
-                  <a:rPr lang="en-US" sz="2800">
-                    <a:latin typeface="Montserrat" panose="00000500000000000000" pitchFamily="2" charset="0"/>
-                  </a:rPr>
-                  <a:t>I </a:t>
-                </a:r>
-                <a:r>
                   <a:rPr lang="en-US" sz="2800" dirty="0">
                     <a:latin typeface="Montserrat" panose="00000500000000000000" pitchFamily="2" charset="0"/>
                   </a:rPr>
-                  <a:t>use the least squares method in order to find for which </a:t>
+                  <a:t>I use the least squares method in order to find for which </a:t>
                 </a:r>
                 <a14:m>
                   <m:oMath xmlns:m="http://schemas.openxmlformats.org/officeDocument/2006/math">
@@ -11440,6 +11434,16 @@
                 </a:endParaRPr>
               </a:p>
               <a:p>
+                <a:endParaRPr lang="en-US" sz="2800" dirty="0">
+                  <a:latin typeface="Montserrat" panose="00000500000000000000" pitchFamily="2" charset="0"/>
+                </a:endParaRPr>
+              </a:p>
+              <a:p>
+                <a:endParaRPr lang="en-US" sz="2800" dirty="0">
+                  <a:latin typeface="Montserrat" panose="00000500000000000000" pitchFamily="2" charset="0"/>
+                </a:endParaRPr>
+              </a:p>
+              <a:p>
                 <a:pPr/>
                 <a14:m>
                   <m:oMathPara xmlns:m="http://schemas.openxmlformats.org/officeDocument/2006/math">
@@ -11792,7 +11796,7 @@
             <p:spPr>
               <a:xfrm>
                 <a:off x="923925" y="1390650"/>
-                <a:ext cx="10325100" cy="2989280"/>
+                <a:ext cx="10325100" cy="3851054"/>
               </a:xfrm>
               <a:prstGeom prst="rect">
                 <a:avLst/>
@@ -11800,7 +11804,7 @@
               <a:blipFill>
                 <a:blip r:embed="rId4"/>
                 <a:stretch>
-                  <a:fillRect l="-1240" t="-1837" r="-1890"/>
+                  <a:fillRect l="-1240" t="-1424" r="-1890"/>
                 </a:stretch>
               </a:blipFill>
             </p:spPr>

</xml_diff>